<commit_message>
update note for gridlstm
</commit_message>
<xml_diff>
--- a/paper_notes/DL_models/nlp/RNN_modeling/images/boundary_state.pptx
+++ b/paper_notes/DL_models/nlp/RNN_modeling/images/boundary_state.pptx
@@ -270,7 +270,7 @@
           <a:p>
             <a:fld id="{D712206D-3887-694D-8599-5607FED9322C}" type="datetimeFigureOut">
               <a:rPr kumimoji="1" lang="zh-CN" altLang="en-US" smtClean="0"/>
-              <a:t>2019/8/8</a:t>
+              <a:t>2019/8/22</a:t>
             </a:fld>
             <a:endParaRPr kumimoji="1" lang="zh-CN" altLang="en-US"/>
           </a:p>
@@ -443,7 +443,7 @@
           <a:p>
             <a:fld id="{D712206D-3887-694D-8599-5607FED9322C}" type="datetimeFigureOut">
               <a:rPr kumimoji="1" lang="zh-CN" altLang="en-US" smtClean="0"/>
-              <a:t>2019/8/8</a:t>
+              <a:t>2019/8/22</a:t>
             </a:fld>
             <a:endParaRPr kumimoji="1" lang="zh-CN" altLang="en-US"/>
           </a:p>
@@ -626,7 +626,7 @@
           <a:p>
             <a:fld id="{D712206D-3887-694D-8599-5607FED9322C}" type="datetimeFigureOut">
               <a:rPr kumimoji="1" lang="zh-CN" altLang="en-US" smtClean="0"/>
-              <a:t>2019/8/8</a:t>
+              <a:t>2019/8/22</a:t>
             </a:fld>
             <a:endParaRPr kumimoji="1" lang="zh-CN" altLang="en-US"/>
           </a:p>
@@ -799,7 +799,7 @@
           <a:p>
             <a:fld id="{D712206D-3887-694D-8599-5607FED9322C}" type="datetimeFigureOut">
               <a:rPr kumimoji="1" lang="zh-CN" altLang="en-US" smtClean="0"/>
-              <a:t>2019/8/8</a:t>
+              <a:t>2019/8/22</a:t>
             </a:fld>
             <a:endParaRPr kumimoji="1" lang="zh-CN" altLang="en-US"/>
           </a:p>
@@ -1077,7 +1077,7 @@
           <a:p>
             <a:fld id="{D712206D-3887-694D-8599-5607FED9322C}" type="datetimeFigureOut">
               <a:rPr kumimoji="1" lang="zh-CN" altLang="en-US" smtClean="0"/>
-              <a:t>2019/8/8</a:t>
+              <a:t>2019/8/22</a:t>
             </a:fld>
             <a:endParaRPr kumimoji="1" lang="zh-CN" altLang="en-US"/>
           </a:p>
@@ -1292,7 +1292,7 @@
           <a:p>
             <a:fld id="{D712206D-3887-694D-8599-5607FED9322C}" type="datetimeFigureOut">
               <a:rPr kumimoji="1" lang="zh-CN" altLang="en-US" smtClean="0"/>
-              <a:t>2019/8/8</a:t>
+              <a:t>2019/8/22</a:t>
             </a:fld>
             <a:endParaRPr kumimoji="1" lang="zh-CN" altLang="en-US"/>
           </a:p>
@@ -1660,7 +1660,7 @@
           <a:p>
             <a:fld id="{D712206D-3887-694D-8599-5607FED9322C}" type="datetimeFigureOut">
               <a:rPr kumimoji="1" lang="zh-CN" altLang="en-US" smtClean="0"/>
-              <a:t>2019/8/8</a:t>
+              <a:t>2019/8/22</a:t>
             </a:fld>
             <a:endParaRPr kumimoji="1" lang="zh-CN" altLang="en-US"/>
           </a:p>
@@ -1801,7 +1801,7 @@
           <a:p>
             <a:fld id="{D712206D-3887-694D-8599-5607FED9322C}" type="datetimeFigureOut">
               <a:rPr kumimoji="1" lang="zh-CN" altLang="en-US" smtClean="0"/>
-              <a:t>2019/8/8</a:t>
+              <a:t>2019/8/22</a:t>
             </a:fld>
             <a:endParaRPr kumimoji="1" lang="zh-CN" altLang="en-US"/>
           </a:p>
@@ -1914,7 +1914,7 @@
           <a:p>
             <a:fld id="{D712206D-3887-694D-8599-5607FED9322C}" type="datetimeFigureOut">
               <a:rPr kumimoji="1" lang="zh-CN" altLang="en-US" smtClean="0"/>
-              <a:t>2019/8/8</a:t>
+              <a:t>2019/8/22</a:t>
             </a:fld>
             <a:endParaRPr kumimoji="1" lang="zh-CN" altLang="en-US"/>
           </a:p>
@@ -2203,7 +2203,7 @@
           <a:p>
             <a:fld id="{D712206D-3887-694D-8599-5607FED9322C}" type="datetimeFigureOut">
               <a:rPr kumimoji="1" lang="zh-CN" altLang="en-US" smtClean="0"/>
-              <a:t>2019/8/8</a:t>
+              <a:t>2019/8/22</a:t>
             </a:fld>
             <a:endParaRPr kumimoji="1" lang="zh-CN" altLang="en-US"/>
           </a:p>
@@ -2494,7 +2494,7 @@
           <a:p>
             <a:fld id="{D712206D-3887-694D-8599-5607FED9322C}" type="datetimeFigureOut">
               <a:rPr kumimoji="1" lang="zh-CN" altLang="en-US" smtClean="0"/>
-              <a:t>2019/8/8</a:t>
+              <a:t>2019/8/22</a:t>
             </a:fld>
             <a:endParaRPr kumimoji="1" lang="zh-CN" altLang="en-US"/>
           </a:p>
@@ -2710,7 +2710,7 @@
           <a:p>
             <a:fld id="{D712206D-3887-694D-8599-5607FED9322C}" type="datetimeFigureOut">
               <a:rPr kumimoji="1" lang="zh-CN" altLang="en-US" smtClean="0"/>
-              <a:t>2019/8/8</a:t>
+              <a:t>2019/8/22</a:t>
             </a:fld>
             <a:endParaRPr kumimoji="1" lang="zh-CN" altLang="en-US"/>
           </a:p>
@@ -3291,410 +3291,6 @@
           <a:prstGeom prst="ellipse">
             <a:avLst/>
           </a:prstGeom>
-          <a:noFill/>
-          <a:ln w="25400"/>
-        </p:spPr>
-        <p:style>
-          <a:lnRef idx="2">
-            <a:schemeClr val="accent1">
-              <a:shade val="50000"/>
-            </a:schemeClr>
-          </a:lnRef>
-          <a:fillRef idx="1">
-            <a:schemeClr val="accent1"/>
-          </a:fillRef>
-          <a:effectRef idx="0">
-            <a:schemeClr val="accent1"/>
-          </a:effectRef>
-          <a:fontRef idx="minor">
-            <a:schemeClr val="lt1"/>
-          </a:fontRef>
-        </p:style>
-        <p:txBody>
-          <a:bodyPr rtlCol="0" anchor="ctr"/>
-          <a:lstStyle/>
-          <a:p>
-            <a:pPr algn="ctr"/>
-            <a:endParaRPr kumimoji="1" lang="zh-CN" altLang="en-US"/>
-          </a:p>
-        </p:txBody>
-      </p:sp>
-      <p:cxnSp>
-        <p:nvCxnSpPr>
-          <p:cNvPr id="9" name="直线箭头连接符 8">
-            <a:extLst>
-              <a:ext uri="{FF2B5EF4-FFF2-40B4-BE49-F238E27FC236}">
-                <a16:creationId xmlns:a16="http://schemas.microsoft.com/office/drawing/2014/main" id="{8F3DBB60-DA90-454D-979A-4C982DD8FD74}"/>
-              </a:ext>
-            </a:extLst>
-          </p:cNvPr>
-          <p:cNvCxnSpPr>
-            <a:stCxn id="4" idx="6"/>
-            <a:endCxn id="5" idx="2"/>
-          </p:cNvCxnSpPr>
-          <p:nvPr/>
-        </p:nvCxnSpPr>
-        <p:spPr>
-          <a:xfrm>
-            <a:off x="2880658" y="1934461"/>
-            <a:ext cx="264059" cy="0"/>
-          </a:xfrm>
-          <a:prstGeom prst="straightConnector1">
-            <a:avLst/>
-          </a:prstGeom>
-          <a:ln>
-            <a:tailEnd type="triangle"/>
-          </a:ln>
-        </p:spPr>
-        <p:style>
-          <a:lnRef idx="1">
-            <a:schemeClr val="accent1"/>
-          </a:lnRef>
-          <a:fillRef idx="0">
-            <a:schemeClr val="accent1"/>
-          </a:fillRef>
-          <a:effectRef idx="0">
-            <a:schemeClr val="accent1"/>
-          </a:effectRef>
-          <a:fontRef idx="minor">
-            <a:schemeClr val="tx1"/>
-          </a:fontRef>
-        </p:style>
-      </p:cxnSp>
-      <p:cxnSp>
-        <p:nvCxnSpPr>
-          <p:cNvPr id="10" name="直线箭头连接符 9">
-            <a:extLst>
-              <a:ext uri="{FF2B5EF4-FFF2-40B4-BE49-F238E27FC236}">
-                <a16:creationId xmlns:a16="http://schemas.microsoft.com/office/drawing/2014/main" id="{0285A199-AACE-474E-BCB6-4332C4D34B90}"/>
-              </a:ext>
-            </a:extLst>
-          </p:cNvPr>
-          <p:cNvCxnSpPr>
-            <a:cxnSpLocks/>
-            <a:stCxn id="5" idx="6"/>
-            <a:endCxn id="6" idx="2"/>
-          </p:cNvCxnSpPr>
-          <p:nvPr/>
-        </p:nvCxnSpPr>
-        <p:spPr>
-          <a:xfrm flipV="1">
-            <a:off x="3449517" y="1931481"/>
-            <a:ext cx="264059" cy="2980"/>
-          </a:xfrm>
-          <a:prstGeom prst="straightConnector1">
-            <a:avLst/>
-          </a:prstGeom>
-          <a:ln>
-            <a:tailEnd type="triangle"/>
-          </a:ln>
-        </p:spPr>
-        <p:style>
-          <a:lnRef idx="1">
-            <a:schemeClr val="accent1"/>
-          </a:lnRef>
-          <a:fillRef idx="0">
-            <a:schemeClr val="accent1"/>
-          </a:fillRef>
-          <a:effectRef idx="0">
-            <a:schemeClr val="accent1"/>
-          </a:effectRef>
-          <a:fontRef idx="minor">
-            <a:schemeClr val="tx1"/>
-          </a:fontRef>
-        </p:style>
-      </p:cxnSp>
-      <p:cxnSp>
-        <p:nvCxnSpPr>
-          <p:cNvPr id="16" name="直线箭头连接符 15">
-            <a:extLst>
-              <a:ext uri="{FF2B5EF4-FFF2-40B4-BE49-F238E27FC236}">
-                <a16:creationId xmlns:a16="http://schemas.microsoft.com/office/drawing/2014/main" id="{5089C9D4-B268-C54F-9C56-8FF4E745ACEC}"/>
-              </a:ext>
-            </a:extLst>
-          </p:cNvPr>
-          <p:cNvCxnSpPr>
-            <a:stCxn id="6" idx="6"/>
-            <a:endCxn id="7" idx="2"/>
-          </p:cNvCxnSpPr>
-          <p:nvPr/>
-        </p:nvCxnSpPr>
-        <p:spPr>
-          <a:xfrm>
-            <a:off x="4018376" y="1931481"/>
-            <a:ext cx="264059" cy="0"/>
-          </a:xfrm>
-          <a:prstGeom prst="straightConnector1">
-            <a:avLst/>
-          </a:prstGeom>
-          <a:ln>
-            <a:tailEnd type="triangle"/>
-          </a:ln>
-        </p:spPr>
-        <p:style>
-          <a:lnRef idx="1">
-            <a:schemeClr val="accent1"/>
-          </a:lnRef>
-          <a:fillRef idx="0">
-            <a:schemeClr val="accent1"/>
-          </a:fillRef>
-          <a:effectRef idx="0">
-            <a:schemeClr val="accent1"/>
-          </a:effectRef>
-          <a:fontRef idx="minor">
-            <a:schemeClr val="tx1"/>
-          </a:fontRef>
-        </p:style>
-      </p:cxnSp>
-      <p:cxnSp>
-        <p:nvCxnSpPr>
-          <p:cNvPr id="17" name="直线箭头连接符 16">
-            <a:extLst>
-              <a:ext uri="{FF2B5EF4-FFF2-40B4-BE49-F238E27FC236}">
-                <a16:creationId xmlns:a16="http://schemas.microsoft.com/office/drawing/2014/main" id="{8D6E55C1-6CBD-424F-8EC6-AAC62590589A}"/>
-              </a:ext>
-            </a:extLst>
-          </p:cNvPr>
-          <p:cNvCxnSpPr>
-            <a:cxnSpLocks/>
-            <a:endCxn id="4" idx="2"/>
-          </p:cNvCxnSpPr>
-          <p:nvPr/>
-        </p:nvCxnSpPr>
-        <p:spPr>
-          <a:xfrm flipV="1">
-            <a:off x="2311799" y="1934461"/>
-            <a:ext cx="264059" cy="7656"/>
-          </a:xfrm>
-          <a:prstGeom prst="straightConnector1">
-            <a:avLst/>
-          </a:prstGeom>
-          <a:ln>
-            <a:tailEnd type="triangle"/>
-          </a:ln>
-        </p:spPr>
-        <p:style>
-          <a:lnRef idx="1">
-            <a:schemeClr val="accent1"/>
-          </a:lnRef>
-          <a:fillRef idx="0">
-            <a:schemeClr val="accent1"/>
-          </a:fillRef>
-          <a:effectRef idx="0">
-            <a:schemeClr val="accent1"/>
-          </a:effectRef>
-          <a:fontRef idx="minor">
-            <a:schemeClr val="tx1"/>
-          </a:fontRef>
-        </p:style>
-      </p:cxnSp>
-      <p:cxnSp>
-        <p:nvCxnSpPr>
-          <p:cNvPr id="20" name="直线箭头连接符 19">
-            <a:extLst>
-              <a:ext uri="{FF2B5EF4-FFF2-40B4-BE49-F238E27FC236}">
-                <a16:creationId xmlns:a16="http://schemas.microsoft.com/office/drawing/2014/main" id="{5761946D-402E-2143-90E4-A55125BE1423}"/>
-              </a:ext>
-            </a:extLst>
-          </p:cNvPr>
-          <p:cNvCxnSpPr>
-            <a:cxnSpLocks/>
-            <a:stCxn id="7" idx="6"/>
-            <a:endCxn id="41" idx="2"/>
-          </p:cNvCxnSpPr>
-          <p:nvPr/>
-        </p:nvCxnSpPr>
-        <p:spPr>
-          <a:xfrm>
-            <a:off x="4587235" y="1931481"/>
-            <a:ext cx="250480" cy="2980"/>
-          </a:xfrm>
-          <a:prstGeom prst="straightConnector1">
-            <a:avLst/>
-          </a:prstGeom>
-          <a:ln>
-            <a:tailEnd type="triangle"/>
-          </a:ln>
-        </p:spPr>
-        <p:style>
-          <a:lnRef idx="1">
-            <a:schemeClr val="accent1"/>
-          </a:lnRef>
-          <a:fillRef idx="0">
-            <a:schemeClr val="accent1"/>
-          </a:fillRef>
-          <a:effectRef idx="0">
-            <a:schemeClr val="accent1"/>
-          </a:effectRef>
-          <a:fontRef idx="minor">
-            <a:schemeClr val="tx1"/>
-          </a:fontRef>
-        </p:style>
-      </p:cxnSp>
-      <p:sp>
-        <p:nvSpPr>
-          <p:cNvPr id="23" name="椭圆 22">
-            <a:extLst>
-              <a:ext uri="{FF2B5EF4-FFF2-40B4-BE49-F238E27FC236}">
-                <a16:creationId xmlns:a16="http://schemas.microsoft.com/office/drawing/2014/main" id="{A37A6E4B-C044-DE4A-8BDB-AD5646F47EC4}"/>
-              </a:ext>
-            </a:extLst>
-          </p:cNvPr>
-          <p:cNvSpPr/>
-          <p:nvPr/>
-        </p:nvSpPr>
-        <p:spPr>
-          <a:xfrm>
-            <a:off x="2575858" y="2228661"/>
-            <a:ext cx="304800" cy="297180"/>
-          </a:xfrm>
-          <a:prstGeom prst="ellipse">
-            <a:avLst/>
-          </a:prstGeom>
-          <a:noFill/>
-          <a:ln w="25400"/>
-        </p:spPr>
-        <p:style>
-          <a:lnRef idx="2">
-            <a:schemeClr val="accent1">
-              <a:shade val="50000"/>
-            </a:schemeClr>
-          </a:lnRef>
-          <a:fillRef idx="1">
-            <a:schemeClr val="accent1"/>
-          </a:fillRef>
-          <a:effectRef idx="0">
-            <a:schemeClr val="accent1"/>
-          </a:effectRef>
-          <a:fontRef idx="minor">
-            <a:schemeClr val="lt1"/>
-          </a:fontRef>
-        </p:style>
-        <p:txBody>
-          <a:bodyPr rtlCol="0" anchor="ctr"/>
-          <a:lstStyle/>
-          <a:p>
-            <a:pPr algn="ctr"/>
-            <a:endParaRPr kumimoji="1" lang="zh-CN" altLang="en-US"/>
-          </a:p>
-        </p:txBody>
-      </p:sp>
-      <p:sp>
-        <p:nvSpPr>
-          <p:cNvPr id="24" name="椭圆 23">
-            <a:extLst>
-              <a:ext uri="{FF2B5EF4-FFF2-40B4-BE49-F238E27FC236}">
-                <a16:creationId xmlns:a16="http://schemas.microsoft.com/office/drawing/2014/main" id="{9D41E2BF-2584-414C-801D-8DA59DBBAB74}"/>
-              </a:ext>
-            </a:extLst>
-          </p:cNvPr>
-          <p:cNvSpPr/>
-          <p:nvPr/>
-        </p:nvSpPr>
-        <p:spPr>
-          <a:xfrm>
-            <a:off x="3144717" y="2228661"/>
-            <a:ext cx="304800" cy="297180"/>
-          </a:xfrm>
-          <a:prstGeom prst="ellipse">
-            <a:avLst/>
-          </a:prstGeom>
-          <a:noFill/>
-          <a:ln w="25400"/>
-        </p:spPr>
-        <p:style>
-          <a:lnRef idx="2">
-            <a:schemeClr val="accent1">
-              <a:shade val="50000"/>
-            </a:schemeClr>
-          </a:lnRef>
-          <a:fillRef idx="1">
-            <a:schemeClr val="accent1"/>
-          </a:fillRef>
-          <a:effectRef idx="0">
-            <a:schemeClr val="accent1"/>
-          </a:effectRef>
-          <a:fontRef idx="minor">
-            <a:schemeClr val="lt1"/>
-          </a:fontRef>
-        </p:style>
-        <p:txBody>
-          <a:bodyPr rtlCol="0" anchor="ctr"/>
-          <a:lstStyle/>
-          <a:p>
-            <a:pPr algn="ctr"/>
-            <a:endParaRPr kumimoji="1" lang="zh-CN" altLang="en-US"/>
-          </a:p>
-        </p:txBody>
-      </p:sp>
-      <p:sp>
-        <p:nvSpPr>
-          <p:cNvPr id="25" name="椭圆 24">
-            <a:extLst>
-              <a:ext uri="{FF2B5EF4-FFF2-40B4-BE49-F238E27FC236}">
-                <a16:creationId xmlns:a16="http://schemas.microsoft.com/office/drawing/2014/main" id="{65B7259D-E2C7-1E45-B85C-719F2BC893BC}"/>
-              </a:ext>
-            </a:extLst>
-          </p:cNvPr>
-          <p:cNvSpPr/>
-          <p:nvPr/>
-        </p:nvSpPr>
-        <p:spPr>
-          <a:xfrm>
-            <a:off x="3713576" y="2225681"/>
-            <a:ext cx="304800" cy="297180"/>
-          </a:xfrm>
-          <a:prstGeom prst="ellipse">
-            <a:avLst/>
-          </a:prstGeom>
-          <a:noFill/>
-          <a:ln w="25400"/>
-        </p:spPr>
-        <p:style>
-          <a:lnRef idx="2">
-            <a:schemeClr val="accent1">
-              <a:shade val="50000"/>
-            </a:schemeClr>
-          </a:lnRef>
-          <a:fillRef idx="1">
-            <a:schemeClr val="accent1"/>
-          </a:fillRef>
-          <a:effectRef idx="0">
-            <a:schemeClr val="accent1"/>
-          </a:effectRef>
-          <a:fontRef idx="minor">
-            <a:schemeClr val="lt1"/>
-          </a:fontRef>
-        </p:style>
-        <p:txBody>
-          <a:bodyPr rtlCol="0" anchor="ctr"/>
-          <a:lstStyle/>
-          <a:p>
-            <a:pPr algn="ctr"/>
-            <a:endParaRPr kumimoji="1" lang="zh-CN" altLang="en-US"/>
-          </a:p>
-        </p:txBody>
-      </p:sp>
-      <p:sp>
-        <p:nvSpPr>
-          <p:cNvPr id="26" name="椭圆 25">
-            <a:extLst>
-              <a:ext uri="{FF2B5EF4-FFF2-40B4-BE49-F238E27FC236}">
-                <a16:creationId xmlns:a16="http://schemas.microsoft.com/office/drawing/2014/main" id="{28212F5F-D53C-7E40-8BF1-A58DEF8ABEC7}"/>
-              </a:ext>
-            </a:extLst>
-          </p:cNvPr>
-          <p:cNvSpPr/>
-          <p:nvPr/>
-        </p:nvSpPr>
-        <p:spPr>
-          <a:xfrm>
-            <a:off x="4282435" y="2225681"/>
-            <a:ext cx="304800" cy="297180"/>
-          </a:xfrm>
-          <a:prstGeom prst="ellipse">
-            <a:avLst/>
-          </a:prstGeom>
           <a:solidFill>
             <a:schemeClr val="accent2">
               <a:lumMod val="20000"/>
@@ -3734,22 +3330,22 @@
       </p:sp>
       <p:cxnSp>
         <p:nvCxnSpPr>
-          <p:cNvPr id="27" name="直线箭头连接符 26">
-            <a:extLst>
-              <a:ext uri="{FF2B5EF4-FFF2-40B4-BE49-F238E27FC236}">
-                <a16:creationId xmlns:a16="http://schemas.microsoft.com/office/drawing/2014/main" id="{D77AA5BC-8588-9840-962D-E61E675206E5}"/>
+          <p:cNvPr id="9" name="直线箭头连接符 8">
+            <a:extLst>
+              <a:ext uri="{FF2B5EF4-FFF2-40B4-BE49-F238E27FC236}">
+                <a16:creationId xmlns:a16="http://schemas.microsoft.com/office/drawing/2014/main" id="{8F3DBB60-DA90-454D-979A-4C982DD8FD74}"/>
               </a:ext>
             </a:extLst>
           </p:cNvPr>
           <p:cNvCxnSpPr>
-            <a:stCxn id="23" idx="6"/>
-            <a:endCxn id="24" idx="2"/>
+            <a:stCxn id="4" idx="6"/>
+            <a:endCxn id="5" idx="2"/>
           </p:cNvCxnSpPr>
           <p:nvPr/>
         </p:nvCxnSpPr>
         <p:spPr>
           <a:xfrm>
-            <a:off x="2880658" y="2377251"/>
+            <a:off x="2880658" y="1934461"/>
             <a:ext cx="264059" cy="0"/>
           </a:xfrm>
           <a:prstGeom prst="straightConnector1">
@@ -3776,23 +3372,23 @@
       </p:cxnSp>
       <p:cxnSp>
         <p:nvCxnSpPr>
-          <p:cNvPr id="28" name="直线箭头连接符 27">
-            <a:extLst>
-              <a:ext uri="{FF2B5EF4-FFF2-40B4-BE49-F238E27FC236}">
-                <a16:creationId xmlns:a16="http://schemas.microsoft.com/office/drawing/2014/main" id="{D7E7A6F4-C9FA-F84B-82AE-88BBE3172DC5}"/>
+          <p:cNvPr id="10" name="直线箭头连接符 9">
+            <a:extLst>
+              <a:ext uri="{FF2B5EF4-FFF2-40B4-BE49-F238E27FC236}">
+                <a16:creationId xmlns:a16="http://schemas.microsoft.com/office/drawing/2014/main" id="{0285A199-AACE-474E-BCB6-4332C4D34B90}"/>
               </a:ext>
             </a:extLst>
           </p:cNvPr>
           <p:cNvCxnSpPr>
             <a:cxnSpLocks/>
-            <a:stCxn id="24" idx="6"/>
-            <a:endCxn id="25" idx="2"/>
+            <a:stCxn id="5" idx="6"/>
+            <a:endCxn id="6" idx="2"/>
           </p:cNvCxnSpPr>
           <p:nvPr/>
         </p:nvCxnSpPr>
         <p:spPr>
           <a:xfrm flipV="1">
-            <a:off x="3449517" y="2374271"/>
+            <a:off x="3449517" y="1931481"/>
             <a:ext cx="264059" cy="2980"/>
           </a:xfrm>
           <a:prstGeom prst="straightConnector1">
@@ -3819,22 +3415,22 @@
       </p:cxnSp>
       <p:cxnSp>
         <p:nvCxnSpPr>
-          <p:cNvPr id="29" name="直线箭头连接符 28">
-            <a:extLst>
-              <a:ext uri="{FF2B5EF4-FFF2-40B4-BE49-F238E27FC236}">
-                <a16:creationId xmlns:a16="http://schemas.microsoft.com/office/drawing/2014/main" id="{80E20236-E9E2-104C-A178-5EE4CD18DB5F}"/>
+          <p:cNvPr id="16" name="直线箭头连接符 15">
+            <a:extLst>
+              <a:ext uri="{FF2B5EF4-FFF2-40B4-BE49-F238E27FC236}">
+                <a16:creationId xmlns:a16="http://schemas.microsoft.com/office/drawing/2014/main" id="{5089C9D4-B268-C54F-9C56-8FF4E745ACEC}"/>
               </a:ext>
             </a:extLst>
           </p:cNvPr>
           <p:cNvCxnSpPr>
-            <a:stCxn id="25" idx="6"/>
-            <a:endCxn id="26" idx="2"/>
+            <a:stCxn id="6" idx="6"/>
+            <a:endCxn id="7" idx="2"/>
           </p:cNvCxnSpPr>
           <p:nvPr/>
         </p:nvCxnSpPr>
         <p:spPr>
           <a:xfrm>
-            <a:off x="4018376" y="2374271"/>
+            <a:off x="4018376" y="1931481"/>
             <a:ext cx="264059" cy="0"/>
           </a:xfrm>
           <a:prstGeom prst="straightConnector1">
@@ -3861,22 +3457,22 @@
       </p:cxnSp>
       <p:cxnSp>
         <p:nvCxnSpPr>
-          <p:cNvPr id="30" name="直线箭头连接符 29">
-            <a:extLst>
-              <a:ext uri="{FF2B5EF4-FFF2-40B4-BE49-F238E27FC236}">
-                <a16:creationId xmlns:a16="http://schemas.microsoft.com/office/drawing/2014/main" id="{3D527011-59FF-3E48-AE74-8CAE5D8591B4}"/>
+          <p:cNvPr id="17" name="直线箭头连接符 16">
+            <a:extLst>
+              <a:ext uri="{FF2B5EF4-FFF2-40B4-BE49-F238E27FC236}">
+                <a16:creationId xmlns:a16="http://schemas.microsoft.com/office/drawing/2014/main" id="{8D6E55C1-6CBD-424F-8EC6-AAC62590589A}"/>
               </a:ext>
             </a:extLst>
           </p:cNvPr>
           <p:cNvCxnSpPr>
             <a:cxnSpLocks/>
-            <a:endCxn id="23" idx="2"/>
+            <a:endCxn id="4" idx="2"/>
           </p:cNvCxnSpPr>
           <p:nvPr/>
         </p:nvCxnSpPr>
         <p:spPr>
           <a:xfrm flipV="1">
-            <a:off x="2311799" y="2377251"/>
+            <a:off x="2311799" y="1934461"/>
             <a:ext cx="264059" cy="7656"/>
           </a:xfrm>
           <a:prstGeom prst="straightConnector1">
@@ -3903,23 +3499,23 @@
       </p:cxnSp>
       <p:cxnSp>
         <p:nvCxnSpPr>
-          <p:cNvPr id="31" name="直线箭头连接符 30">
-            <a:extLst>
-              <a:ext uri="{FF2B5EF4-FFF2-40B4-BE49-F238E27FC236}">
-                <a16:creationId xmlns:a16="http://schemas.microsoft.com/office/drawing/2014/main" id="{CCB085EE-2F02-184E-8A64-67A03CB66864}"/>
+          <p:cNvPr id="20" name="直线箭头连接符 19">
+            <a:extLst>
+              <a:ext uri="{FF2B5EF4-FFF2-40B4-BE49-F238E27FC236}">
+                <a16:creationId xmlns:a16="http://schemas.microsoft.com/office/drawing/2014/main" id="{5761946D-402E-2143-90E4-A55125BE1423}"/>
               </a:ext>
             </a:extLst>
           </p:cNvPr>
           <p:cNvCxnSpPr>
             <a:cxnSpLocks/>
-            <a:stCxn id="26" idx="6"/>
-            <a:endCxn id="49" idx="2"/>
+            <a:stCxn id="7" idx="6"/>
+            <a:endCxn id="41" idx="2"/>
           </p:cNvCxnSpPr>
           <p:nvPr/>
         </p:nvCxnSpPr>
         <p:spPr>
           <a:xfrm>
-            <a:off x="4587235" y="2374271"/>
+            <a:off x="4587235" y="1931481"/>
             <a:ext cx="250480" cy="2980"/>
           </a:xfrm>
           <a:prstGeom prst="straightConnector1">
@@ -3946,10 +3542,10 @@
       </p:cxnSp>
       <p:sp>
         <p:nvSpPr>
-          <p:cNvPr id="32" name="椭圆 31">
-            <a:extLst>
-              <a:ext uri="{FF2B5EF4-FFF2-40B4-BE49-F238E27FC236}">
-                <a16:creationId xmlns:a16="http://schemas.microsoft.com/office/drawing/2014/main" id="{D4A56DEF-15ED-224A-9082-9E7DDEA08842}"/>
+          <p:cNvPr id="23" name="椭圆 22">
+            <a:extLst>
+              <a:ext uri="{FF2B5EF4-FFF2-40B4-BE49-F238E27FC236}">
+                <a16:creationId xmlns:a16="http://schemas.microsoft.com/office/drawing/2014/main" id="{A37A6E4B-C044-DE4A-8BDB-AD5646F47EC4}"/>
               </a:ext>
             </a:extLst>
           </p:cNvPr>
@@ -3958,7 +3554,7 @@
         </p:nvSpPr>
         <p:spPr>
           <a:xfrm>
-            <a:off x="2575858" y="2685749"/>
+            <a:off x="2575858" y="2228661"/>
             <a:ext cx="304800" cy="297180"/>
           </a:xfrm>
           <a:prstGeom prst="ellipse">
@@ -3994,10 +3590,10 @@
       </p:sp>
       <p:sp>
         <p:nvSpPr>
-          <p:cNvPr id="33" name="椭圆 32">
-            <a:extLst>
-              <a:ext uri="{FF2B5EF4-FFF2-40B4-BE49-F238E27FC236}">
-                <a16:creationId xmlns:a16="http://schemas.microsoft.com/office/drawing/2014/main" id="{9C5926ED-1C66-F94E-9E48-96B6A1EA7602}"/>
+          <p:cNvPr id="24" name="椭圆 23">
+            <a:extLst>
+              <a:ext uri="{FF2B5EF4-FFF2-40B4-BE49-F238E27FC236}">
+                <a16:creationId xmlns:a16="http://schemas.microsoft.com/office/drawing/2014/main" id="{9D41E2BF-2584-414C-801D-8DA59DBBAB74}"/>
               </a:ext>
             </a:extLst>
           </p:cNvPr>
@@ -4006,7 +3602,7 @@
         </p:nvSpPr>
         <p:spPr>
           <a:xfrm>
-            <a:off x="3144717" y="2685749"/>
+            <a:off x="3144717" y="2228661"/>
             <a:ext cx="304800" cy="297180"/>
           </a:xfrm>
           <a:prstGeom prst="ellipse">
@@ -4042,10 +3638,10 @@
       </p:sp>
       <p:sp>
         <p:nvSpPr>
-          <p:cNvPr id="34" name="椭圆 33">
-            <a:extLst>
-              <a:ext uri="{FF2B5EF4-FFF2-40B4-BE49-F238E27FC236}">
-                <a16:creationId xmlns:a16="http://schemas.microsoft.com/office/drawing/2014/main" id="{A0BFD6D2-2042-6F43-8D61-B1FBB500794B}"/>
+          <p:cNvPr id="25" name="椭圆 24">
+            <a:extLst>
+              <a:ext uri="{FF2B5EF4-FFF2-40B4-BE49-F238E27FC236}">
+                <a16:creationId xmlns:a16="http://schemas.microsoft.com/office/drawing/2014/main" id="{65B7259D-E2C7-1E45-B85C-719F2BC893BC}"/>
               </a:ext>
             </a:extLst>
           </p:cNvPr>
@@ -4054,7 +3650,7 @@
         </p:nvSpPr>
         <p:spPr>
           <a:xfrm>
-            <a:off x="3713576" y="2682769"/>
+            <a:off x="3713576" y="2225681"/>
             <a:ext cx="304800" cy="297180"/>
           </a:xfrm>
           <a:prstGeom prst="ellipse">
@@ -4090,10 +3686,10 @@
       </p:sp>
       <p:sp>
         <p:nvSpPr>
-          <p:cNvPr id="35" name="椭圆 34">
-            <a:extLst>
-              <a:ext uri="{FF2B5EF4-FFF2-40B4-BE49-F238E27FC236}">
-                <a16:creationId xmlns:a16="http://schemas.microsoft.com/office/drawing/2014/main" id="{E618DE11-C1FE-BE46-9ECB-B1F4393B42D6}"/>
+          <p:cNvPr id="26" name="椭圆 25">
+            <a:extLst>
+              <a:ext uri="{FF2B5EF4-FFF2-40B4-BE49-F238E27FC236}">
+                <a16:creationId xmlns:a16="http://schemas.microsoft.com/office/drawing/2014/main" id="{28212F5F-D53C-7E40-8BF1-A58DEF8ABEC7}"/>
               </a:ext>
             </a:extLst>
           </p:cNvPr>
@@ -4102,994 +3698,7 @@
         </p:nvSpPr>
         <p:spPr>
           <a:xfrm>
-            <a:off x="4282435" y="2682769"/>
-            <a:ext cx="304800" cy="297180"/>
-          </a:xfrm>
-          <a:prstGeom prst="ellipse">
-            <a:avLst/>
-          </a:prstGeom>
-          <a:noFill/>
-          <a:ln w="25400"/>
-        </p:spPr>
-        <p:style>
-          <a:lnRef idx="2">
-            <a:schemeClr val="accent1">
-              <a:shade val="50000"/>
-            </a:schemeClr>
-          </a:lnRef>
-          <a:fillRef idx="1">
-            <a:schemeClr val="accent1"/>
-          </a:fillRef>
-          <a:effectRef idx="0">
-            <a:schemeClr val="accent1"/>
-          </a:effectRef>
-          <a:fontRef idx="minor">
-            <a:schemeClr val="lt1"/>
-          </a:fontRef>
-        </p:style>
-        <p:txBody>
-          <a:bodyPr rtlCol="0" anchor="ctr"/>
-          <a:lstStyle/>
-          <a:p>
-            <a:pPr algn="ctr"/>
-            <a:endParaRPr kumimoji="1" lang="zh-CN" altLang="en-US"/>
-          </a:p>
-        </p:txBody>
-      </p:sp>
-      <p:cxnSp>
-        <p:nvCxnSpPr>
-          <p:cNvPr id="36" name="直线箭头连接符 35">
-            <a:extLst>
-              <a:ext uri="{FF2B5EF4-FFF2-40B4-BE49-F238E27FC236}">
-                <a16:creationId xmlns:a16="http://schemas.microsoft.com/office/drawing/2014/main" id="{0DCBC276-C013-3F47-9AA8-A246CCC03F0A}"/>
-              </a:ext>
-            </a:extLst>
-          </p:cNvPr>
-          <p:cNvCxnSpPr>
-            <a:stCxn id="32" idx="6"/>
-            <a:endCxn id="33" idx="2"/>
-          </p:cNvCxnSpPr>
-          <p:nvPr/>
-        </p:nvCxnSpPr>
-        <p:spPr>
-          <a:xfrm>
-            <a:off x="2880658" y="2834339"/>
-            <a:ext cx="264059" cy="0"/>
-          </a:xfrm>
-          <a:prstGeom prst="straightConnector1">
-            <a:avLst/>
-          </a:prstGeom>
-          <a:ln>
-            <a:tailEnd type="triangle"/>
-          </a:ln>
-        </p:spPr>
-        <p:style>
-          <a:lnRef idx="1">
-            <a:schemeClr val="accent1"/>
-          </a:lnRef>
-          <a:fillRef idx="0">
-            <a:schemeClr val="accent1"/>
-          </a:fillRef>
-          <a:effectRef idx="0">
-            <a:schemeClr val="accent1"/>
-          </a:effectRef>
-          <a:fontRef idx="minor">
-            <a:schemeClr val="tx1"/>
-          </a:fontRef>
-        </p:style>
-      </p:cxnSp>
-      <p:cxnSp>
-        <p:nvCxnSpPr>
-          <p:cNvPr id="37" name="直线箭头连接符 36">
-            <a:extLst>
-              <a:ext uri="{FF2B5EF4-FFF2-40B4-BE49-F238E27FC236}">
-                <a16:creationId xmlns:a16="http://schemas.microsoft.com/office/drawing/2014/main" id="{D575C937-9B17-7642-944B-6553CE4DA2FD}"/>
-              </a:ext>
-            </a:extLst>
-          </p:cNvPr>
-          <p:cNvCxnSpPr>
-            <a:cxnSpLocks/>
-            <a:stCxn id="33" idx="6"/>
-            <a:endCxn id="34" idx="2"/>
-          </p:cNvCxnSpPr>
-          <p:nvPr/>
-        </p:nvCxnSpPr>
-        <p:spPr>
-          <a:xfrm flipV="1">
-            <a:off x="3449517" y="2831359"/>
-            <a:ext cx="264059" cy="2980"/>
-          </a:xfrm>
-          <a:prstGeom prst="straightConnector1">
-            <a:avLst/>
-          </a:prstGeom>
-          <a:ln>
-            <a:tailEnd type="triangle"/>
-          </a:ln>
-        </p:spPr>
-        <p:style>
-          <a:lnRef idx="1">
-            <a:schemeClr val="accent1"/>
-          </a:lnRef>
-          <a:fillRef idx="0">
-            <a:schemeClr val="accent1"/>
-          </a:fillRef>
-          <a:effectRef idx="0">
-            <a:schemeClr val="accent1"/>
-          </a:effectRef>
-          <a:fontRef idx="minor">
-            <a:schemeClr val="tx1"/>
-          </a:fontRef>
-        </p:style>
-      </p:cxnSp>
-      <p:cxnSp>
-        <p:nvCxnSpPr>
-          <p:cNvPr id="38" name="直线箭头连接符 37">
-            <a:extLst>
-              <a:ext uri="{FF2B5EF4-FFF2-40B4-BE49-F238E27FC236}">
-                <a16:creationId xmlns:a16="http://schemas.microsoft.com/office/drawing/2014/main" id="{BAFB44F1-FB5C-8544-9832-55C8B0981F38}"/>
-              </a:ext>
-            </a:extLst>
-          </p:cNvPr>
-          <p:cNvCxnSpPr>
-            <a:stCxn id="34" idx="6"/>
-            <a:endCxn id="35" idx="2"/>
-          </p:cNvCxnSpPr>
-          <p:nvPr/>
-        </p:nvCxnSpPr>
-        <p:spPr>
-          <a:xfrm>
-            <a:off x="4018376" y="2831359"/>
-            <a:ext cx="264059" cy="0"/>
-          </a:xfrm>
-          <a:prstGeom prst="straightConnector1">
-            <a:avLst/>
-          </a:prstGeom>
-          <a:ln>
-            <a:tailEnd type="triangle"/>
-          </a:ln>
-        </p:spPr>
-        <p:style>
-          <a:lnRef idx="1">
-            <a:schemeClr val="accent1"/>
-          </a:lnRef>
-          <a:fillRef idx="0">
-            <a:schemeClr val="accent1"/>
-          </a:fillRef>
-          <a:effectRef idx="0">
-            <a:schemeClr val="accent1"/>
-          </a:effectRef>
-          <a:fontRef idx="minor">
-            <a:schemeClr val="tx1"/>
-          </a:fontRef>
-        </p:style>
-      </p:cxnSp>
-      <p:cxnSp>
-        <p:nvCxnSpPr>
-          <p:cNvPr id="39" name="直线箭头连接符 38">
-            <a:extLst>
-              <a:ext uri="{FF2B5EF4-FFF2-40B4-BE49-F238E27FC236}">
-                <a16:creationId xmlns:a16="http://schemas.microsoft.com/office/drawing/2014/main" id="{3744C73E-53F4-A840-A742-8B3432168789}"/>
-              </a:ext>
-            </a:extLst>
-          </p:cNvPr>
-          <p:cNvCxnSpPr>
-            <a:cxnSpLocks/>
-            <a:endCxn id="32" idx="2"/>
-          </p:cNvCxnSpPr>
-          <p:nvPr/>
-        </p:nvCxnSpPr>
-        <p:spPr>
-          <a:xfrm flipV="1">
-            <a:off x="2311799" y="2834339"/>
-            <a:ext cx="264059" cy="7656"/>
-          </a:xfrm>
-          <a:prstGeom prst="straightConnector1">
-            <a:avLst/>
-          </a:prstGeom>
-          <a:ln>
-            <a:tailEnd type="triangle"/>
-          </a:ln>
-        </p:spPr>
-        <p:style>
-          <a:lnRef idx="1">
-            <a:schemeClr val="accent1"/>
-          </a:lnRef>
-          <a:fillRef idx="0">
-            <a:schemeClr val="accent1"/>
-          </a:fillRef>
-          <a:effectRef idx="0">
-            <a:schemeClr val="accent1"/>
-          </a:effectRef>
-          <a:fontRef idx="minor">
-            <a:schemeClr val="tx1"/>
-          </a:fontRef>
-        </p:style>
-      </p:cxnSp>
-      <p:cxnSp>
-        <p:nvCxnSpPr>
-          <p:cNvPr id="40" name="直线箭头连接符 39">
-            <a:extLst>
-              <a:ext uri="{FF2B5EF4-FFF2-40B4-BE49-F238E27FC236}">
-                <a16:creationId xmlns:a16="http://schemas.microsoft.com/office/drawing/2014/main" id="{2FBC5A65-2D04-6540-9A57-E4AB93C7D018}"/>
-              </a:ext>
-            </a:extLst>
-          </p:cNvPr>
-          <p:cNvCxnSpPr>
-            <a:cxnSpLocks/>
-            <a:stCxn id="35" idx="6"/>
-            <a:endCxn id="57" idx="2"/>
-          </p:cNvCxnSpPr>
-          <p:nvPr/>
-        </p:nvCxnSpPr>
-        <p:spPr>
-          <a:xfrm>
-            <a:off x="4587235" y="2831359"/>
-            <a:ext cx="250480" cy="2980"/>
-          </a:xfrm>
-          <a:prstGeom prst="straightConnector1">
-            <a:avLst/>
-          </a:prstGeom>
-          <a:ln>
-            <a:tailEnd type="triangle"/>
-          </a:ln>
-        </p:spPr>
-        <p:style>
-          <a:lnRef idx="1">
-            <a:schemeClr val="accent1"/>
-          </a:lnRef>
-          <a:fillRef idx="0">
-            <a:schemeClr val="accent1"/>
-          </a:fillRef>
-          <a:effectRef idx="0">
-            <a:schemeClr val="accent1"/>
-          </a:effectRef>
-          <a:fontRef idx="minor">
-            <a:schemeClr val="tx1"/>
-          </a:fontRef>
-        </p:style>
-      </p:cxnSp>
-      <p:sp>
-        <p:nvSpPr>
-          <p:cNvPr id="41" name="椭圆 40">
-            <a:extLst>
-              <a:ext uri="{FF2B5EF4-FFF2-40B4-BE49-F238E27FC236}">
-                <a16:creationId xmlns:a16="http://schemas.microsoft.com/office/drawing/2014/main" id="{D8E73B4C-2791-2641-8A26-309B00926B49}"/>
-              </a:ext>
-            </a:extLst>
-          </p:cNvPr>
-          <p:cNvSpPr/>
-          <p:nvPr/>
-        </p:nvSpPr>
-        <p:spPr>
-          <a:xfrm>
-            <a:off x="4837715" y="1785871"/>
-            <a:ext cx="304800" cy="297180"/>
-          </a:xfrm>
-          <a:prstGeom prst="ellipse">
-            <a:avLst/>
-          </a:prstGeom>
-          <a:noFill/>
-          <a:ln w="25400"/>
-        </p:spPr>
-        <p:style>
-          <a:lnRef idx="2">
-            <a:schemeClr val="accent1">
-              <a:shade val="50000"/>
-            </a:schemeClr>
-          </a:lnRef>
-          <a:fillRef idx="1">
-            <a:schemeClr val="accent1"/>
-          </a:fillRef>
-          <a:effectRef idx="0">
-            <a:schemeClr val="accent1"/>
-          </a:effectRef>
-          <a:fontRef idx="minor">
-            <a:schemeClr val="lt1"/>
-          </a:fontRef>
-        </p:style>
-        <p:txBody>
-          <a:bodyPr rtlCol="0" anchor="ctr"/>
-          <a:lstStyle/>
-          <a:p>
-            <a:pPr algn="ctr"/>
-            <a:endParaRPr kumimoji="1" lang="zh-CN" altLang="en-US"/>
-          </a:p>
-        </p:txBody>
-      </p:sp>
-      <p:sp>
-        <p:nvSpPr>
-          <p:cNvPr id="42" name="椭圆 41">
-            <a:extLst>
-              <a:ext uri="{FF2B5EF4-FFF2-40B4-BE49-F238E27FC236}">
-                <a16:creationId xmlns:a16="http://schemas.microsoft.com/office/drawing/2014/main" id="{BECA202E-AA73-1245-BA85-B00B3D152057}"/>
-              </a:ext>
-            </a:extLst>
-          </p:cNvPr>
-          <p:cNvSpPr/>
-          <p:nvPr/>
-        </p:nvSpPr>
-        <p:spPr>
-          <a:xfrm>
-            <a:off x="5406574" y="1785871"/>
-            <a:ext cx="304800" cy="297180"/>
-          </a:xfrm>
-          <a:prstGeom prst="ellipse">
-            <a:avLst/>
-          </a:prstGeom>
-          <a:noFill/>
-          <a:ln w="25400"/>
-        </p:spPr>
-        <p:style>
-          <a:lnRef idx="2">
-            <a:schemeClr val="accent1">
-              <a:shade val="50000"/>
-            </a:schemeClr>
-          </a:lnRef>
-          <a:fillRef idx="1">
-            <a:schemeClr val="accent1"/>
-          </a:fillRef>
-          <a:effectRef idx="0">
-            <a:schemeClr val="accent1"/>
-          </a:effectRef>
-          <a:fontRef idx="minor">
-            <a:schemeClr val="lt1"/>
-          </a:fontRef>
-        </p:style>
-        <p:txBody>
-          <a:bodyPr rtlCol="0" anchor="ctr"/>
-          <a:lstStyle/>
-          <a:p>
-            <a:pPr algn="ctr"/>
-            <a:endParaRPr kumimoji="1" lang="zh-CN" altLang="en-US"/>
-          </a:p>
-        </p:txBody>
-      </p:sp>
-      <p:sp>
-        <p:nvSpPr>
-          <p:cNvPr id="43" name="椭圆 42">
-            <a:extLst>
-              <a:ext uri="{FF2B5EF4-FFF2-40B4-BE49-F238E27FC236}">
-                <a16:creationId xmlns:a16="http://schemas.microsoft.com/office/drawing/2014/main" id="{9815569B-7810-7441-9C43-F18B165A11F8}"/>
-              </a:ext>
-            </a:extLst>
-          </p:cNvPr>
-          <p:cNvSpPr/>
-          <p:nvPr/>
-        </p:nvSpPr>
-        <p:spPr>
-          <a:xfrm>
-            <a:off x="5975433" y="1782891"/>
-            <a:ext cx="304800" cy="297180"/>
-          </a:xfrm>
-          <a:prstGeom prst="ellipse">
-            <a:avLst/>
-          </a:prstGeom>
-          <a:noFill/>
-          <a:ln w="25400"/>
-        </p:spPr>
-        <p:style>
-          <a:lnRef idx="2">
-            <a:schemeClr val="accent1">
-              <a:shade val="50000"/>
-            </a:schemeClr>
-          </a:lnRef>
-          <a:fillRef idx="1">
-            <a:schemeClr val="accent1"/>
-          </a:fillRef>
-          <a:effectRef idx="0">
-            <a:schemeClr val="accent1"/>
-          </a:effectRef>
-          <a:fontRef idx="minor">
-            <a:schemeClr val="lt1"/>
-          </a:fontRef>
-        </p:style>
-        <p:txBody>
-          <a:bodyPr rtlCol="0" anchor="ctr"/>
-          <a:lstStyle/>
-          <a:p>
-            <a:pPr algn="ctr"/>
-            <a:endParaRPr kumimoji="1" lang="zh-CN" altLang="en-US"/>
-          </a:p>
-        </p:txBody>
-      </p:sp>
-      <p:sp>
-        <p:nvSpPr>
-          <p:cNvPr id="44" name="椭圆 43">
-            <a:extLst>
-              <a:ext uri="{FF2B5EF4-FFF2-40B4-BE49-F238E27FC236}">
-                <a16:creationId xmlns:a16="http://schemas.microsoft.com/office/drawing/2014/main" id="{BC13692C-3FCB-7047-B3A1-B97231B421E9}"/>
-              </a:ext>
-            </a:extLst>
-          </p:cNvPr>
-          <p:cNvSpPr/>
-          <p:nvPr/>
-        </p:nvSpPr>
-        <p:spPr>
-          <a:xfrm>
-            <a:off x="6544292" y="1782891"/>
-            <a:ext cx="304800" cy="297180"/>
-          </a:xfrm>
-          <a:prstGeom prst="ellipse">
-            <a:avLst/>
-          </a:prstGeom>
-          <a:noFill/>
-          <a:ln w="25400"/>
-        </p:spPr>
-        <p:style>
-          <a:lnRef idx="2">
-            <a:schemeClr val="accent1">
-              <a:shade val="50000"/>
-            </a:schemeClr>
-          </a:lnRef>
-          <a:fillRef idx="1">
-            <a:schemeClr val="accent1"/>
-          </a:fillRef>
-          <a:effectRef idx="0">
-            <a:schemeClr val="accent1"/>
-          </a:effectRef>
-          <a:fontRef idx="minor">
-            <a:schemeClr val="lt1"/>
-          </a:fontRef>
-        </p:style>
-        <p:txBody>
-          <a:bodyPr rtlCol="0" anchor="ctr"/>
-          <a:lstStyle/>
-          <a:p>
-            <a:pPr algn="ctr"/>
-            <a:endParaRPr kumimoji="1" lang="zh-CN" altLang="en-US"/>
-          </a:p>
-        </p:txBody>
-      </p:sp>
-      <p:cxnSp>
-        <p:nvCxnSpPr>
-          <p:cNvPr id="45" name="直线箭头连接符 44">
-            <a:extLst>
-              <a:ext uri="{FF2B5EF4-FFF2-40B4-BE49-F238E27FC236}">
-                <a16:creationId xmlns:a16="http://schemas.microsoft.com/office/drawing/2014/main" id="{4A868968-540A-584C-B8FB-2F4D97E25CA9}"/>
-              </a:ext>
-            </a:extLst>
-          </p:cNvPr>
-          <p:cNvCxnSpPr>
-            <a:stCxn id="41" idx="6"/>
-            <a:endCxn id="42" idx="2"/>
-          </p:cNvCxnSpPr>
-          <p:nvPr/>
-        </p:nvCxnSpPr>
-        <p:spPr>
-          <a:xfrm>
-            <a:off x="5142515" y="1934461"/>
-            <a:ext cx="264059" cy="0"/>
-          </a:xfrm>
-          <a:prstGeom prst="straightConnector1">
-            <a:avLst/>
-          </a:prstGeom>
-          <a:ln>
-            <a:tailEnd type="triangle"/>
-          </a:ln>
-        </p:spPr>
-        <p:style>
-          <a:lnRef idx="1">
-            <a:schemeClr val="accent1"/>
-          </a:lnRef>
-          <a:fillRef idx="0">
-            <a:schemeClr val="accent1"/>
-          </a:fillRef>
-          <a:effectRef idx="0">
-            <a:schemeClr val="accent1"/>
-          </a:effectRef>
-          <a:fontRef idx="minor">
-            <a:schemeClr val="tx1"/>
-          </a:fontRef>
-        </p:style>
-      </p:cxnSp>
-      <p:cxnSp>
-        <p:nvCxnSpPr>
-          <p:cNvPr id="46" name="直线箭头连接符 45">
-            <a:extLst>
-              <a:ext uri="{FF2B5EF4-FFF2-40B4-BE49-F238E27FC236}">
-                <a16:creationId xmlns:a16="http://schemas.microsoft.com/office/drawing/2014/main" id="{4C277C93-29F5-4544-927D-D85AF37D783B}"/>
-              </a:ext>
-            </a:extLst>
-          </p:cNvPr>
-          <p:cNvCxnSpPr>
-            <a:cxnSpLocks/>
-            <a:stCxn id="42" idx="6"/>
-            <a:endCxn id="43" idx="2"/>
-          </p:cNvCxnSpPr>
-          <p:nvPr/>
-        </p:nvCxnSpPr>
-        <p:spPr>
-          <a:xfrm flipV="1">
-            <a:off x="5711374" y="1931481"/>
-            <a:ext cx="264059" cy="2980"/>
-          </a:xfrm>
-          <a:prstGeom prst="straightConnector1">
-            <a:avLst/>
-          </a:prstGeom>
-          <a:ln>
-            <a:tailEnd type="triangle"/>
-          </a:ln>
-        </p:spPr>
-        <p:style>
-          <a:lnRef idx="1">
-            <a:schemeClr val="accent1"/>
-          </a:lnRef>
-          <a:fillRef idx="0">
-            <a:schemeClr val="accent1"/>
-          </a:fillRef>
-          <a:effectRef idx="0">
-            <a:schemeClr val="accent1"/>
-          </a:effectRef>
-          <a:fontRef idx="minor">
-            <a:schemeClr val="tx1"/>
-          </a:fontRef>
-        </p:style>
-      </p:cxnSp>
-      <p:cxnSp>
-        <p:nvCxnSpPr>
-          <p:cNvPr id="47" name="直线箭头连接符 46">
-            <a:extLst>
-              <a:ext uri="{FF2B5EF4-FFF2-40B4-BE49-F238E27FC236}">
-                <a16:creationId xmlns:a16="http://schemas.microsoft.com/office/drawing/2014/main" id="{89FE023C-4CC7-E54B-ABA2-831441FCAE8E}"/>
-              </a:ext>
-            </a:extLst>
-          </p:cNvPr>
-          <p:cNvCxnSpPr>
-            <a:stCxn id="43" idx="6"/>
-            <a:endCxn id="44" idx="2"/>
-          </p:cNvCxnSpPr>
-          <p:nvPr/>
-        </p:nvCxnSpPr>
-        <p:spPr>
-          <a:xfrm>
-            <a:off x="6280233" y="1931481"/>
-            <a:ext cx="264059" cy="0"/>
-          </a:xfrm>
-          <a:prstGeom prst="straightConnector1">
-            <a:avLst/>
-          </a:prstGeom>
-          <a:ln>
-            <a:tailEnd type="triangle"/>
-          </a:ln>
-        </p:spPr>
-        <p:style>
-          <a:lnRef idx="1">
-            <a:schemeClr val="accent1"/>
-          </a:lnRef>
-          <a:fillRef idx="0">
-            <a:schemeClr val="accent1"/>
-          </a:fillRef>
-          <a:effectRef idx="0">
-            <a:schemeClr val="accent1"/>
-          </a:effectRef>
-          <a:fontRef idx="minor">
-            <a:schemeClr val="tx1"/>
-          </a:fontRef>
-        </p:style>
-      </p:cxnSp>
-      <p:cxnSp>
-        <p:nvCxnSpPr>
-          <p:cNvPr id="48" name="直线箭头连接符 47">
-            <a:extLst>
-              <a:ext uri="{FF2B5EF4-FFF2-40B4-BE49-F238E27FC236}">
-                <a16:creationId xmlns:a16="http://schemas.microsoft.com/office/drawing/2014/main" id="{E279A78C-772C-9F44-90F2-9F29E75579C5}"/>
-              </a:ext>
-            </a:extLst>
-          </p:cNvPr>
-          <p:cNvCxnSpPr>
-            <a:cxnSpLocks/>
-            <a:stCxn id="44" idx="6"/>
-          </p:cNvCxnSpPr>
-          <p:nvPr/>
-        </p:nvCxnSpPr>
-        <p:spPr>
-          <a:xfrm>
-            <a:off x="6849092" y="1931481"/>
-            <a:ext cx="264059" cy="0"/>
-          </a:xfrm>
-          <a:prstGeom prst="straightConnector1">
-            <a:avLst/>
-          </a:prstGeom>
-          <a:ln>
-            <a:tailEnd type="triangle"/>
-          </a:ln>
-        </p:spPr>
-        <p:style>
-          <a:lnRef idx="1">
-            <a:schemeClr val="accent1"/>
-          </a:lnRef>
-          <a:fillRef idx="0">
-            <a:schemeClr val="accent1"/>
-          </a:fillRef>
-          <a:effectRef idx="0">
-            <a:schemeClr val="accent1"/>
-          </a:effectRef>
-          <a:fontRef idx="minor">
-            <a:schemeClr val="tx1"/>
-          </a:fontRef>
-        </p:style>
-      </p:cxnSp>
-      <p:sp>
-        <p:nvSpPr>
-          <p:cNvPr id="49" name="椭圆 48">
-            <a:extLst>
-              <a:ext uri="{FF2B5EF4-FFF2-40B4-BE49-F238E27FC236}">
-                <a16:creationId xmlns:a16="http://schemas.microsoft.com/office/drawing/2014/main" id="{BFC14748-6E5F-EE46-B776-44253072A142}"/>
-              </a:ext>
-            </a:extLst>
-          </p:cNvPr>
-          <p:cNvSpPr/>
-          <p:nvPr/>
-        </p:nvSpPr>
-        <p:spPr>
-          <a:xfrm>
-            <a:off x="4837715" y="2228661"/>
-            <a:ext cx="304800" cy="297180"/>
-          </a:xfrm>
-          <a:prstGeom prst="ellipse">
-            <a:avLst/>
-          </a:prstGeom>
-          <a:noFill/>
-          <a:ln w="25400">
-            <a:solidFill>
-              <a:srgbClr val="C00000"/>
-            </a:solidFill>
-            <a:prstDash val="dash"/>
-          </a:ln>
-        </p:spPr>
-        <p:style>
-          <a:lnRef idx="2">
-            <a:schemeClr val="accent1">
-              <a:shade val="50000"/>
-            </a:schemeClr>
-          </a:lnRef>
-          <a:fillRef idx="1">
-            <a:schemeClr val="accent1"/>
-          </a:fillRef>
-          <a:effectRef idx="0">
-            <a:schemeClr val="accent1"/>
-          </a:effectRef>
-          <a:fontRef idx="minor">
-            <a:schemeClr val="lt1"/>
-          </a:fontRef>
-        </p:style>
-        <p:txBody>
-          <a:bodyPr rtlCol="0" anchor="ctr"/>
-          <a:lstStyle/>
-          <a:p>
-            <a:pPr algn="ctr"/>
-            <a:endParaRPr kumimoji="1" lang="zh-CN" altLang="en-US"/>
-          </a:p>
-        </p:txBody>
-      </p:sp>
-      <p:sp>
-        <p:nvSpPr>
-          <p:cNvPr id="50" name="椭圆 49">
-            <a:extLst>
-              <a:ext uri="{FF2B5EF4-FFF2-40B4-BE49-F238E27FC236}">
-                <a16:creationId xmlns:a16="http://schemas.microsoft.com/office/drawing/2014/main" id="{F695B7A0-8DD2-3047-B430-96354E52844A}"/>
-              </a:ext>
-            </a:extLst>
-          </p:cNvPr>
-          <p:cNvSpPr/>
-          <p:nvPr/>
-        </p:nvSpPr>
-        <p:spPr>
-          <a:xfrm>
-            <a:off x="5406574" y="2228661"/>
-            <a:ext cx="304800" cy="297180"/>
-          </a:xfrm>
-          <a:prstGeom prst="ellipse">
-            <a:avLst/>
-          </a:prstGeom>
-          <a:noFill/>
-          <a:ln w="25400"/>
-        </p:spPr>
-        <p:style>
-          <a:lnRef idx="2">
-            <a:schemeClr val="accent1">
-              <a:shade val="50000"/>
-            </a:schemeClr>
-          </a:lnRef>
-          <a:fillRef idx="1">
-            <a:schemeClr val="accent1"/>
-          </a:fillRef>
-          <a:effectRef idx="0">
-            <a:schemeClr val="accent1"/>
-          </a:effectRef>
-          <a:fontRef idx="minor">
-            <a:schemeClr val="lt1"/>
-          </a:fontRef>
-        </p:style>
-        <p:txBody>
-          <a:bodyPr rtlCol="0" anchor="ctr"/>
-          <a:lstStyle/>
-          <a:p>
-            <a:pPr algn="ctr"/>
-            <a:endParaRPr kumimoji="1" lang="zh-CN" altLang="en-US"/>
-          </a:p>
-        </p:txBody>
-      </p:sp>
-      <p:sp>
-        <p:nvSpPr>
-          <p:cNvPr id="51" name="椭圆 50">
-            <a:extLst>
-              <a:ext uri="{FF2B5EF4-FFF2-40B4-BE49-F238E27FC236}">
-                <a16:creationId xmlns:a16="http://schemas.microsoft.com/office/drawing/2014/main" id="{2289AC6B-5495-F14A-A6BB-CB8AB334CAEC}"/>
-              </a:ext>
-            </a:extLst>
-          </p:cNvPr>
-          <p:cNvSpPr/>
-          <p:nvPr/>
-        </p:nvSpPr>
-        <p:spPr>
-          <a:xfrm>
-            <a:off x="5975433" y="2225681"/>
-            <a:ext cx="304800" cy="297180"/>
-          </a:xfrm>
-          <a:prstGeom prst="ellipse">
-            <a:avLst/>
-          </a:prstGeom>
-          <a:noFill/>
-          <a:ln w="25400"/>
-        </p:spPr>
-        <p:style>
-          <a:lnRef idx="2">
-            <a:schemeClr val="accent1">
-              <a:shade val="50000"/>
-            </a:schemeClr>
-          </a:lnRef>
-          <a:fillRef idx="1">
-            <a:schemeClr val="accent1"/>
-          </a:fillRef>
-          <a:effectRef idx="0">
-            <a:schemeClr val="accent1"/>
-          </a:effectRef>
-          <a:fontRef idx="minor">
-            <a:schemeClr val="lt1"/>
-          </a:fontRef>
-        </p:style>
-        <p:txBody>
-          <a:bodyPr rtlCol="0" anchor="ctr"/>
-          <a:lstStyle/>
-          <a:p>
-            <a:pPr algn="ctr"/>
-            <a:endParaRPr kumimoji="1" lang="zh-CN" altLang="en-US"/>
-          </a:p>
-        </p:txBody>
-      </p:sp>
-      <p:sp>
-        <p:nvSpPr>
-          <p:cNvPr id="52" name="椭圆 51">
-            <a:extLst>
-              <a:ext uri="{FF2B5EF4-FFF2-40B4-BE49-F238E27FC236}">
-                <a16:creationId xmlns:a16="http://schemas.microsoft.com/office/drawing/2014/main" id="{8881C692-79FA-704E-AECE-A421C425CBC7}"/>
-              </a:ext>
-            </a:extLst>
-          </p:cNvPr>
-          <p:cNvSpPr/>
-          <p:nvPr/>
-        </p:nvSpPr>
-        <p:spPr>
-          <a:xfrm>
-            <a:off x="6544292" y="2225681"/>
-            <a:ext cx="304800" cy="297180"/>
-          </a:xfrm>
-          <a:prstGeom prst="ellipse">
-            <a:avLst/>
-          </a:prstGeom>
-          <a:noFill/>
-          <a:ln w="25400"/>
-        </p:spPr>
-        <p:style>
-          <a:lnRef idx="2">
-            <a:schemeClr val="accent1">
-              <a:shade val="50000"/>
-            </a:schemeClr>
-          </a:lnRef>
-          <a:fillRef idx="1">
-            <a:schemeClr val="accent1"/>
-          </a:fillRef>
-          <a:effectRef idx="0">
-            <a:schemeClr val="accent1"/>
-          </a:effectRef>
-          <a:fontRef idx="minor">
-            <a:schemeClr val="lt1"/>
-          </a:fontRef>
-        </p:style>
-        <p:txBody>
-          <a:bodyPr rtlCol="0" anchor="ctr"/>
-          <a:lstStyle/>
-          <a:p>
-            <a:pPr algn="ctr"/>
-            <a:endParaRPr kumimoji="1" lang="zh-CN" altLang="en-US"/>
-          </a:p>
-        </p:txBody>
-      </p:sp>
-      <p:cxnSp>
-        <p:nvCxnSpPr>
-          <p:cNvPr id="53" name="直线箭头连接符 52">
-            <a:extLst>
-              <a:ext uri="{FF2B5EF4-FFF2-40B4-BE49-F238E27FC236}">
-                <a16:creationId xmlns:a16="http://schemas.microsoft.com/office/drawing/2014/main" id="{22E43156-2B4A-614B-9E7D-1571C3B2C12C}"/>
-              </a:ext>
-            </a:extLst>
-          </p:cNvPr>
-          <p:cNvCxnSpPr>
-            <a:stCxn id="49" idx="6"/>
-            <a:endCxn id="50" idx="2"/>
-          </p:cNvCxnSpPr>
-          <p:nvPr/>
-        </p:nvCxnSpPr>
-        <p:spPr>
-          <a:xfrm>
-            <a:off x="5142515" y="2377251"/>
-            <a:ext cx="264059" cy="0"/>
-          </a:xfrm>
-          <a:prstGeom prst="straightConnector1">
-            <a:avLst/>
-          </a:prstGeom>
-          <a:ln>
-            <a:tailEnd type="triangle"/>
-          </a:ln>
-        </p:spPr>
-        <p:style>
-          <a:lnRef idx="1">
-            <a:schemeClr val="accent1"/>
-          </a:lnRef>
-          <a:fillRef idx="0">
-            <a:schemeClr val="accent1"/>
-          </a:fillRef>
-          <a:effectRef idx="0">
-            <a:schemeClr val="accent1"/>
-          </a:effectRef>
-          <a:fontRef idx="minor">
-            <a:schemeClr val="tx1"/>
-          </a:fontRef>
-        </p:style>
-      </p:cxnSp>
-      <p:cxnSp>
-        <p:nvCxnSpPr>
-          <p:cNvPr id="54" name="直线箭头连接符 53">
-            <a:extLst>
-              <a:ext uri="{FF2B5EF4-FFF2-40B4-BE49-F238E27FC236}">
-                <a16:creationId xmlns:a16="http://schemas.microsoft.com/office/drawing/2014/main" id="{E7689691-1C89-B34B-A97D-1BC5396A56A8}"/>
-              </a:ext>
-            </a:extLst>
-          </p:cNvPr>
-          <p:cNvCxnSpPr>
-            <a:cxnSpLocks/>
-            <a:stCxn id="50" idx="6"/>
-            <a:endCxn id="51" idx="2"/>
-          </p:cNvCxnSpPr>
-          <p:nvPr/>
-        </p:nvCxnSpPr>
-        <p:spPr>
-          <a:xfrm flipV="1">
-            <a:off x="5711374" y="2374271"/>
-            <a:ext cx="264059" cy="2980"/>
-          </a:xfrm>
-          <a:prstGeom prst="straightConnector1">
-            <a:avLst/>
-          </a:prstGeom>
-          <a:ln>
-            <a:tailEnd type="triangle"/>
-          </a:ln>
-        </p:spPr>
-        <p:style>
-          <a:lnRef idx="1">
-            <a:schemeClr val="accent1"/>
-          </a:lnRef>
-          <a:fillRef idx="0">
-            <a:schemeClr val="accent1"/>
-          </a:fillRef>
-          <a:effectRef idx="0">
-            <a:schemeClr val="accent1"/>
-          </a:effectRef>
-          <a:fontRef idx="minor">
-            <a:schemeClr val="tx1"/>
-          </a:fontRef>
-        </p:style>
-      </p:cxnSp>
-      <p:cxnSp>
-        <p:nvCxnSpPr>
-          <p:cNvPr id="55" name="直线箭头连接符 54">
-            <a:extLst>
-              <a:ext uri="{FF2B5EF4-FFF2-40B4-BE49-F238E27FC236}">
-                <a16:creationId xmlns:a16="http://schemas.microsoft.com/office/drawing/2014/main" id="{7E0EDBB8-D8BC-BE47-AE86-59B053CFCA92}"/>
-              </a:ext>
-            </a:extLst>
-          </p:cNvPr>
-          <p:cNvCxnSpPr>
-            <a:stCxn id="51" idx="6"/>
-            <a:endCxn id="52" idx="2"/>
-          </p:cNvCxnSpPr>
-          <p:nvPr/>
-        </p:nvCxnSpPr>
-        <p:spPr>
-          <a:xfrm>
-            <a:off x="6280233" y="2374271"/>
-            <a:ext cx="264059" cy="0"/>
-          </a:xfrm>
-          <a:prstGeom prst="straightConnector1">
-            <a:avLst/>
-          </a:prstGeom>
-          <a:ln>
-            <a:tailEnd type="triangle"/>
-          </a:ln>
-        </p:spPr>
-        <p:style>
-          <a:lnRef idx="1">
-            <a:schemeClr val="accent1"/>
-          </a:lnRef>
-          <a:fillRef idx="0">
-            <a:schemeClr val="accent1"/>
-          </a:fillRef>
-          <a:effectRef idx="0">
-            <a:schemeClr val="accent1"/>
-          </a:effectRef>
-          <a:fontRef idx="minor">
-            <a:schemeClr val="tx1"/>
-          </a:fontRef>
-        </p:style>
-      </p:cxnSp>
-      <p:cxnSp>
-        <p:nvCxnSpPr>
-          <p:cNvPr id="56" name="直线箭头连接符 55">
-            <a:extLst>
-              <a:ext uri="{FF2B5EF4-FFF2-40B4-BE49-F238E27FC236}">
-                <a16:creationId xmlns:a16="http://schemas.microsoft.com/office/drawing/2014/main" id="{0A442C18-126F-9443-8B84-1B12D4783DE6}"/>
-              </a:ext>
-            </a:extLst>
-          </p:cNvPr>
-          <p:cNvCxnSpPr>
-            <a:cxnSpLocks/>
-            <a:stCxn id="52" idx="6"/>
-          </p:cNvCxnSpPr>
-          <p:nvPr/>
-        </p:nvCxnSpPr>
-        <p:spPr>
-          <a:xfrm>
-            <a:off x="6849092" y="2374271"/>
-            <a:ext cx="264059" cy="0"/>
-          </a:xfrm>
-          <a:prstGeom prst="straightConnector1">
-            <a:avLst/>
-          </a:prstGeom>
-          <a:ln>
-            <a:tailEnd type="triangle"/>
-          </a:ln>
-        </p:spPr>
-        <p:style>
-          <a:lnRef idx="1">
-            <a:schemeClr val="accent1"/>
-          </a:lnRef>
-          <a:fillRef idx="0">
-            <a:schemeClr val="accent1"/>
-          </a:fillRef>
-          <a:effectRef idx="0">
-            <a:schemeClr val="accent1"/>
-          </a:effectRef>
-          <a:fontRef idx="minor">
-            <a:schemeClr val="tx1"/>
-          </a:fontRef>
-        </p:style>
-      </p:cxnSp>
-      <p:sp>
-        <p:nvSpPr>
-          <p:cNvPr id="57" name="椭圆 56">
-            <a:extLst>
-              <a:ext uri="{FF2B5EF4-FFF2-40B4-BE49-F238E27FC236}">
-                <a16:creationId xmlns:a16="http://schemas.microsoft.com/office/drawing/2014/main" id="{28B909A1-CD20-644B-8433-97AB0EBD5159}"/>
-              </a:ext>
-            </a:extLst>
-          </p:cNvPr>
-          <p:cNvSpPr/>
-          <p:nvPr/>
-        </p:nvSpPr>
-        <p:spPr>
-          <a:xfrm>
-            <a:off x="4837715" y="2685749"/>
+            <a:off x="4282435" y="2225681"/>
             <a:ext cx="304800" cy="297180"/>
           </a:xfrm>
           <a:prstGeom prst="ellipse">
@@ -5132,6 +3741,1406 @@
           </a:p>
         </p:txBody>
       </p:sp>
+      <p:cxnSp>
+        <p:nvCxnSpPr>
+          <p:cNvPr id="27" name="直线箭头连接符 26">
+            <a:extLst>
+              <a:ext uri="{FF2B5EF4-FFF2-40B4-BE49-F238E27FC236}">
+                <a16:creationId xmlns:a16="http://schemas.microsoft.com/office/drawing/2014/main" id="{D77AA5BC-8588-9840-962D-E61E675206E5}"/>
+              </a:ext>
+            </a:extLst>
+          </p:cNvPr>
+          <p:cNvCxnSpPr>
+            <a:stCxn id="23" idx="6"/>
+            <a:endCxn id="24" idx="2"/>
+          </p:cNvCxnSpPr>
+          <p:nvPr/>
+        </p:nvCxnSpPr>
+        <p:spPr>
+          <a:xfrm>
+            <a:off x="2880658" y="2377251"/>
+            <a:ext cx="264059" cy="0"/>
+          </a:xfrm>
+          <a:prstGeom prst="straightConnector1">
+            <a:avLst/>
+          </a:prstGeom>
+          <a:ln>
+            <a:tailEnd type="triangle"/>
+          </a:ln>
+        </p:spPr>
+        <p:style>
+          <a:lnRef idx="1">
+            <a:schemeClr val="accent1"/>
+          </a:lnRef>
+          <a:fillRef idx="0">
+            <a:schemeClr val="accent1"/>
+          </a:fillRef>
+          <a:effectRef idx="0">
+            <a:schemeClr val="accent1"/>
+          </a:effectRef>
+          <a:fontRef idx="minor">
+            <a:schemeClr val="tx1"/>
+          </a:fontRef>
+        </p:style>
+      </p:cxnSp>
+      <p:cxnSp>
+        <p:nvCxnSpPr>
+          <p:cNvPr id="28" name="直线箭头连接符 27">
+            <a:extLst>
+              <a:ext uri="{FF2B5EF4-FFF2-40B4-BE49-F238E27FC236}">
+                <a16:creationId xmlns:a16="http://schemas.microsoft.com/office/drawing/2014/main" id="{D7E7A6F4-C9FA-F84B-82AE-88BBE3172DC5}"/>
+              </a:ext>
+            </a:extLst>
+          </p:cNvPr>
+          <p:cNvCxnSpPr>
+            <a:cxnSpLocks/>
+            <a:stCxn id="24" idx="6"/>
+            <a:endCxn id="25" idx="2"/>
+          </p:cNvCxnSpPr>
+          <p:nvPr/>
+        </p:nvCxnSpPr>
+        <p:spPr>
+          <a:xfrm flipV="1">
+            <a:off x="3449517" y="2374271"/>
+            <a:ext cx="264059" cy="2980"/>
+          </a:xfrm>
+          <a:prstGeom prst="straightConnector1">
+            <a:avLst/>
+          </a:prstGeom>
+          <a:ln>
+            <a:tailEnd type="triangle"/>
+          </a:ln>
+        </p:spPr>
+        <p:style>
+          <a:lnRef idx="1">
+            <a:schemeClr val="accent1"/>
+          </a:lnRef>
+          <a:fillRef idx="0">
+            <a:schemeClr val="accent1"/>
+          </a:fillRef>
+          <a:effectRef idx="0">
+            <a:schemeClr val="accent1"/>
+          </a:effectRef>
+          <a:fontRef idx="minor">
+            <a:schemeClr val="tx1"/>
+          </a:fontRef>
+        </p:style>
+      </p:cxnSp>
+      <p:cxnSp>
+        <p:nvCxnSpPr>
+          <p:cNvPr id="29" name="直线箭头连接符 28">
+            <a:extLst>
+              <a:ext uri="{FF2B5EF4-FFF2-40B4-BE49-F238E27FC236}">
+                <a16:creationId xmlns:a16="http://schemas.microsoft.com/office/drawing/2014/main" id="{80E20236-E9E2-104C-A178-5EE4CD18DB5F}"/>
+              </a:ext>
+            </a:extLst>
+          </p:cNvPr>
+          <p:cNvCxnSpPr>
+            <a:stCxn id="25" idx="6"/>
+            <a:endCxn id="26" idx="2"/>
+          </p:cNvCxnSpPr>
+          <p:nvPr/>
+        </p:nvCxnSpPr>
+        <p:spPr>
+          <a:xfrm>
+            <a:off x="4018376" y="2374271"/>
+            <a:ext cx="264059" cy="0"/>
+          </a:xfrm>
+          <a:prstGeom prst="straightConnector1">
+            <a:avLst/>
+          </a:prstGeom>
+          <a:ln>
+            <a:tailEnd type="triangle"/>
+          </a:ln>
+        </p:spPr>
+        <p:style>
+          <a:lnRef idx="1">
+            <a:schemeClr val="accent1"/>
+          </a:lnRef>
+          <a:fillRef idx="0">
+            <a:schemeClr val="accent1"/>
+          </a:fillRef>
+          <a:effectRef idx="0">
+            <a:schemeClr val="accent1"/>
+          </a:effectRef>
+          <a:fontRef idx="minor">
+            <a:schemeClr val="tx1"/>
+          </a:fontRef>
+        </p:style>
+      </p:cxnSp>
+      <p:cxnSp>
+        <p:nvCxnSpPr>
+          <p:cNvPr id="30" name="直线箭头连接符 29">
+            <a:extLst>
+              <a:ext uri="{FF2B5EF4-FFF2-40B4-BE49-F238E27FC236}">
+                <a16:creationId xmlns:a16="http://schemas.microsoft.com/office/drawing/2014/main" id="{3D527011-59FF-3E48-AE74-8CAE5D8591B4}"/>
+              </a:ext>
+            </a:extLst>
+          </p:cNvPr>
+          <p:cNvCxnSpPr>
+            <a:cxnSpLocks/>
+            <a:endCxn id="23" idx="2"/>
+          </p:cNvCxnSpPr>
+          <p:nvPr/>
+        </p:nvCxnSpPr>
+        <p:spPr>
+          <a:xfrm flipV="1">
+            <a:off x="2311799" y="2377251"/>
+            <a:ext cx="264059" cy="7656"/>
+          </a:xfrm>
+          <a:prstGeom prst="straightConnector1">
+            <a:avLst/>
+          </a:prstGeom>
+          <a:ln>
+            <a:tailEnd type="triangle"/>
+          </a:ln>
+        </p:spPr>
+        <p:style>
+          <a:lnRef idx="1">
+            <a:schemeClr val="accent1"/>
+          </a:lnRef>
+          <a:fillRef idx="0">
+            <a:schemeClr val="accent1"/>
+          </a:fillRef>
+          <a:effectRef idx="0">
+            <a:schemeClr val="accent1"/>
+          </a:effectRef>
+          <a:fontRef idx="minor">
+            <a:schemeClr val="tx1"/>
+          </a:fontRef>
+        </p:style>
+      </p:cxnSp>
+      <p:cxnSp>
+        <p:nvCxnSpPr>
+          <p:cNvPr id="31" name="直线箭头连接符 30">
+            <a:extLst>
+              <a:ext uri="{FF2B5EF4-FFF2-40B4-BE49-F238E27FC236}">
+                <a16:creationId xmlns:a16="http://schemas.microsoft.com/office/drawing/2014/main" id="{CCB085EE-2F02-184E-8A64-67A03CB66864}"/>
+              </a:ext>
+            </a:extLst>
+          </p:cNvPr>
+          <p:cNvCxnSpPr>
+            <a:cxnSpLocks/>
+            <a:stCxn id="26" idx="6"/>
+            <a:endCxn id="49" idx="2"/>
+          </p:cNvCxnSpPr>
+          <p:nvPr/>
+        </p:nvCxnSpPr>
+        <p:spPr>
+          <a:xfrm>
+            <a:off x="4587235" y="2374271"/>
+            <a:ext cx="250480" cy="2980"/>
+          </a:xfrm>
+          <a:prstGeom prst="straightConnector1">
+            <a:avLst/>
+          </a:prstGeom>
+          <a:ln>
+            <a:tailEnd type="triangle"/>
+          </a:ln>
+        </p:spPr>
+        <p:style>
+          <a:lnRef idx="1">
+            <a:schemeClr val="accent1"/>
+          </a:lnRef>
+          <a:fillRef idx="0">
+            <a:schemeClr val="accent1"/>
+          </a:fillRef>
+          <a:effectRef idx="0">
+            <a:schemeClr val="accent1"/>
+          </a:effectRef>
+          <a:fontRef idx="minor">
+            <a:schemeClr val="tx1"/>
+          </a:fontRef>
+        </p:style>
+      </p:cxnSp>
+      <p:sp>
+        <p:nvSpPr>
+          <p:cNvPr id="32" name="椭圆 31">
+            <a:extLst>
+              <a:ext uri="{FF2B5EF4-FFF2-40B4-BE49-F238E27FC236}">
+                <a16:creationId xmlns:a16="http://schemas.microsoft.com/office/drawing/2014/main" id="{D4A56DEF-15ED-224A-9082-9E7DDEA08842}"/>
+              </a:ext>
+            </a:extLst>
+          </p:cNvPr>
+          <p:cNvSpPr/>
+          <p:nvPr/>
+        </p:nvSpPr>
+        <p:spPr>
+          <a:xfrm>
+            <a:off x="2575858" y="2685749"/>
+            <a:ext cx="304800" cy="297180"/>
+          </a:xfrm>
+          <a:prstGeom prst="ellipse">
+            <a:avLst/>
+          </a:prstGeom>
+          <a:noFill/>
+          <a:ln w="25400"/>
+        </p:spPr>
+        <p:style>
+          <a:lnRef idx="2">
+            <a:schemeClr val="accent1">
+              <a:shade val="50000"/>
+            </a:schemeClr>
+          </a:lnRef>
+          <a:fillRef idx="1">
+            <a:schemeClr val="accent1"/>
+          </a:fillRef>
+          <a:effectRef idx="0">
+            <a:schemeClr val="accent1"/>
+          </a:effectRef>
+          <a:fontRef idx="minor">
+            <a:schemeClr val="lt1"/>
+          </a:fontRef>
+        </p:style>
+        <p:txBody>
+          <a:bodyPr rtlCol="0" anchor="ctr"/>
+          <a:lstStyle/>
+          <a:p>
+            <a:pPr algn="ctr"/>
+            <a:endParaRPr kumimoji="1" lang="zh-CN" altLang="en-US"/>
+          </a:p>
+        </p:txBody>
+      </p:sp>
+      <p:sp>
+        <p:nvSpPr>
+          <p:cNvPr id="33" name="椭圆 32">
+            <a:extLst>
+              <a:ext uri="{FF2B5EF4-FFF2-40B4-BE49-F238E27FC236}">
+                <a16:creationId xmlns:a16="http://schemas.microsoft.com/office/drawing/2014/main" id="{9C5926ED-1C66-F94E-9E48-96B6A1EA7602}"/>
+              </a:ext>
+            </a:extLst>
+          </p:cNvPr>
+          <p:cNvSpPr/>
+          <p:nvPr/>
+        </p:nvSpPr>
+        <p:spPr>
+          <a:xfrm>
+            <a:off x="3144717" y="2685749"/>
+            <a:ext cx="304800" cy="297180"/>
+          </a:xfrm>
+          <a:prstGeom prst="ellipse">
+            <a:avLst/>
+          </a:prstGeom>
+          <a:noFill/>
+          <a:ln w="25400"/>
+        </p:spPr>
+        <p:style>
+          <a:lnRef idx="2">
+            <a:schemeClr val="accent1">
+              <a:shade val="50000"/>
+            </a:schemeClr>
+          </a:lnRef>
+          <a:fillRef idx="1">
+            <a:schemeClr val="accent1"/>
+          </a:fillRef>
+          <a:effectRef idx="0">
+            <a:schemeClr val="accent1"/>
+          </a:effectRef>
+          <a:fontRef idx="minor">
+            <a:schemeClr val="lt1"/>
+          </a:fontRef>
+        </p:style>
+        <p:txBody>
+          <a:bodyPr rtlCol="0" anchor="ctr"/>
+          <a:lstStyle/>
+          <a:p>
+            <a:pPr algn="ctr"/>
+            <a:endParaRPr kumimoji="1" lang="zh-CN" altLang="en-US"/>
+          </a:p>
+        </p:txBody>
+      </p:sp>
+      <p:sp>
+        <p:nvSpPr>
+          <p:cNvPr id="34" name="椭圆 33">
+            <a:extLst>
+              <a:ext uri="{FF2B5EF4-FFF2-40B4-BE49-F238E27FC236}">
+                <a16:creationId xmlns:a16="http://schemas.microsoft.com/office/drawing/2014/main" id="{A0BFD6D2-2042-6F43-8D61-B1FBB500794B}"/>
+              </a:ext>
+            </a:extLst>
+          </p:cNvPr>
+          <p:cNvSpPr/>
+          <p:nvPr/>
+        </p:nvSpPr>
+        <p:spPr>
+          <a:xfrm>
+            <a:off x="3713576" y="2682769"/>
+            <a:ext cx="304800" cy="297180"/>
+          </a:xfrm>
+          <a:prstGeom prst="ellipse">
+            <a:avLst/>
+          </a:prstGeom>
+          <a:noFill/>
+          <a:ln w="25400"/>
+        </p:spPr>
+        <p:style>
+          <a:lnRef idx="2">
+            <a:schemeClr val="accent1">
+              <a:shade val="50000"/>
+            </a:schemeClr>
+          </a:lnRef>
+          <a:fillRef idx="1">
+            <a:schemeClr val="accent1"/>
+          </a:fillRef>
+          <a:effectRef idx="0">
+            <a:schemeClr val="accent1"/>
+          </a:effectRef>
+          <a:fontRef idx="minor">
+            <a:schemeClr val="lt1"/>
+          </a:fontRef>
+        </p:style>
+        <p:txBody>
+          <a:bodyPr rtlCol="0" anchor="ctr"/>
+          <a:lstStyle/>
+          <a:p>
+            <a:pPr algn="ctr"/>
+            <a:endParaRPr kumimoji="1" lang="zh-CN" altLang="en-US"/>
+          </a:p>
+        </p:txBody>
+      </p:sp>
+      <p:sp>
+        <p:nvSpPr>
+          <p:cNvPr id="35" name="椭圆 34">
+            <a:extLst>
+              <a:ext uri="{FF2B5EF4-FFF2-40B4-BE49-F238E27FC236}">
+                <a16:creationId xmlns:a16="http://schemas.microsoft.com/office/drawing/2014/main" id="{E618DE11-C1FE-BE46-9ECB-B1F4393B42D6}"/>
+              </a:ext>
+            </a:extLst>
+          </p:cNvPr>
+          <p:cNvSpPr/>
+          <p:nvPr/>
+        </p:nvSpPr>
+        <p:spPr>
+          <a:xfrm>
+            <a:off x="4282435" y="2682769"/>
+            <a:ext cx="304800" cy="297180"/>
+          </a:xfrm>
+          <a:prstGeom prst="ellipse">
+            <a:avLst/>
+          </a:prstGeom>
+          <a:noFill/>
+          <a:ln w="25400"/>
+        </p:spPr>
+        <p:style>
+          <a:lnRef idx="2">
+            <a:schemeClr val="accent1">
+              <a:shade val="50000"/>
+            </a:schemeClr>
+          </a:lnRef>
+          <a:fillRef idx="1">
+            <a:schemeClr val="accent1"/>
+          </a:fillRef>
+          <a:effectRef idx="0">
+            <a:schemeClr val="accent1"/>
+          </a:effectRef>
+          <a:fontRef idx="minor">
+            <a:schemeClr val="lt1"/>
+          </a:fontRef>
+        </p:style>
+        <p:txBody>
+          <a:bodyPr rtlCol="0" anchor="ctr"/>
+          <a:lstStyle/>
+          <a:p>
+            <a:pPr algn="ctr"/>
+            <a:endParaRPr kumimoji="1" lang="zh-CN" altLang="en-US"/>
+          </a:p>
+        </p:txBody>
+      </p:sp>
+      <p:cxnSp>
+        <p:nvCxnSpPr>
+          <p:cNvPr id="36" name="直线箭头连接符 35">
+            <a:extLst>
+              <a:ext uri="{FF2B5EF4-FFF2-40B4-BE49-F238E27FC236}">
+                <a16:creationId xmlns:a16="http://schemas.microsoft.com/office/drawing/2014/main" id="{0DCBC276-C013-3F47-9AA8-A246CCC03F0A}"/>
+              </a:ext>
+            </a:extLst>
+          </p:cNvPr>
+          <p:cNvCxnSpPr>
+            <a:stCxn id="32" idx="6"/>
+            <a:endCxn id="33" idx="2"/>
+          </p:cNvCxnSpPr>
+          <p:nvPr/>
+        </p:nvCxnSpPr>
+        <p:spPr>
+          <a:xfrm>
+            <a:off x="2880658" y="2834339"/>
+            <a:ext cx="264059" cy="0"/>
+          </a:xfrm>
+          <a:prstGeom prst="straightConnector1">
+            <a:avLst/>
+          </a:prstGeom>
+          <a:ln>
+            <a:tailEnd type="triangle"/>
+          </a:ln>
+        </p:spPr>
+        <p:style>
+          <a:lnRef idx="1">
+            <a:schemeClr val="accent1"/>
+          </a:lnRef>
+          <a:fillRef idx="0">
+            <a:schemeClr val="accent1"/>
+          </a:fillRef>
+          <a:effectRef idx="0">
+            <a:schemeClr val="accent1"/>
+          </a:effectRef>
+          <a:fontRef idx="minor">
+            <a:schemeClr val="tx1"/>
+          </a:fontRef>
+        </p:style>
+      </p:cxnSp>
+      <p:cxnSp>
+        <p:nvCxnSpPr>
+          <p:cNvPr id="37" name="直线箭头连接符 36">
+            <a:extLst>
+              <a:ext uri="{FF2B5EF4-FFF2-40B4-BE49-F238E27FC236}">
+                <a16:creationId xmlns:a16="http://schemas.microsoft.com/office/drawing/2014/main" id="{D575C937-9B17-7642-944B-6553CE4DA2FD}"/>
+              </a:ext>
+            </a:extLst>
+          </p:cNvPr>
+          <p:cNvCxnSpPr>
+            <a:cxnSpLocks/>
+            <a:stCxn id="33" idx="6"/>
+            <a:endCxn id="34" idx="2"/>
+          </p:cNvCxnSpPr>
+          <p:nvPr/>
+        </p:nvCxnSpPr>
+        <p:spPr>
+          <a:xfrm flipV="1">
+            <a:off x="3449517" y="2831359"/>
+            <a:ext cx="264059" cy="2980"/>
+          </a:xfrm>
+          <a:prstGeom prst="straightConnector1">
+            <a:avLst/>
+          </a:prstGeom>
+          <a:ln>
+            <a:tailEnd type="triangle"/>
+          </a:ln>
+        </p:spPr>
+        <p:style>
+          <a:lnRef idx="1">
+            <a:schemeClr val="accent1"/>
+          </a:lnRef>
+          <a:fillRef idx="0">
+            <a:schemeClr val="accent1"/>
+          </a:fillRef>
+          <a:effectRef idx="0">
+            <a:schemeClr val="accent1"/>
+          </a:effectRef>
+          <a:fontRef idx="minor">
+            <a:schemeClr val="tx1"/>
+          </a:fontRef>
+        </p:style>
+      </p:cxnSp>
+      <p:cxnSp>
+        <p:nvCxnSpPr>
+          <p:cNvPr id="38" name="直线箭头连接符 37">
+            <a:extLst>
+              <a:ext uri="{FF2B5EF4-FFF2-40B4-BE49-F238E27FC236}">
+                <a16:creationId xmlns:a16="http://schemas.microsoft.com/office/drawing/2014/main" id="{BAFB44F1-FB5C-8544-9832-55C8B0981F38}"/>
+              </a:ext>
+            </a:extLst>
+          </p:cNvPr>
+          <p:cNvCxnSpPr>
+            <a:stCxn id="34" idx="6"/>
+            <a:endCxn id="35" idx="2"/>
+          </p:cNvCxnSpPr>
+          <p:nvPr/>
+        </p:nvCxnSpPr>
+        <p:spPr>
+          <a:xfrm>
+            <a:off x="4018376" y="2831359"/>
+            <a:ext cx="264059" cy="0"/>
+          </a:xfrm>
+          <a:prstGeom prst="straightConnector1">
+            <a:avLst/>
+          </a:prstGeom>
+          <a:ln>
+            <a:tailEnd type="triangle"/>
+          </a:ln>
+        </p:spPr>
+        <p:style>
+          <a:lnRef idx="1">
+            <a:schemeClr val="accent1"/>
+          </a:lnRef>
+          <a:fillRef idx="0">
+            <a:schemeClr val="accent1"/>
+          </a:fillRef>
+          <a:effectRef idx="0">
+            <a:schemeClr val="accent1"/>
+          </a:effectRef>
+          <a:fontRef idx="minor">
+            <a:schemeClr val="tx1"/>
+          </a:fontRef>
+        </p:style>
+      </p:cxnSp>
+      <p:cxnSp>
+        <p:nvCxnSpPr>
+          <p:cNvPr id="39" name="直线箭头连接符 38">
+            <a:extLst>
+              <a:ext uri="{FF2B5EF4-FFF2-40B4-BE49-F238E27FC236}">
+                <a16:creationId xmlns:a16="http://schemas.microsoft.com/office/drawing/2014/main" id="{3744C73E-53F4-A840-A742-8B3432168789}"/>
+              </a:ext>
+            </a:extLst>
+          </p:cNvPr>
+          <p:cNvCxnSpPr>
+            <a:cxnSpLocks/>
+            <a:endCxn id="32" idx="2"/>
+          </p:cNvCxnSpPr>
+          <p:nvPr/>
+        </p:nvCxnSpPr>
+        <p:spPr>
+          <a:xfrm flipV="1">
+            <a:off x="2311799" y="2834339"/>
+            <a:ext cx="264059" cy="7656"/>
+          </a:xfrm>
+          <a:prstGeom prst="straightConnector1">
+            <a:avLst/>
+          </a:prstGeom>
+          <a:ln>
+            <a:tailEnd type="triangle"/>
+          </a:ln>
+        </p:spPr>
+        <p:style>
+          <a:lnRef idx="1">
+            <a:schemeClr val="accent1"/>
+          </a:lnRef>
+          <a:fillRef idx="0">
+            <a:schemeClr val="accent1"/>
+          </a:fillRef>
+          <a:effectRef idx="0">
+            <a:schemeClr val="accent1"/>
+          </a:effectRef>
+          <a:fontRef idx="minor">
+            <a:schemeClr val="tx1"/>
+          </a:fontRef>
+        </p:style>
+      </p:cxnSp>
+      <p:cxnSp>
+        <p:nvCxnSpPr>
+          <p:cNvPr id="40" name="直线箭头连接符 39">
+            <a:extLst>
+              <a:ext uri="{FF2B5EF4-FFF2-40B4-BE49-F238E27FC236}">
+                <a16:creationId xmlns:a16="http://schemas.microsoft.com/office/drawing/2014/main" id="{2FBC5A65-2D04-6540-9A57-E4AB93C7D018}"/>
+              </a:ext>
+            </a:extLst>
+          </p:cNvPr>
+          <p:cNvCxnSpPr>
+            <a:cxnSpLocks/>
+            <a:stCxn id="35" idx="6"/>
+            <a:endCxn id="57" idx="2"/>
+          </p:cNvCxnSpPr>
+          <p:nvPr/>
+        </p:nvCxnSpPr>
+        <p:spPr>
+          <a:xfrm>
+            <a:off x="4587235" y="2831359"/>
+            <a:ext cx="250480" cy="2980"/>
+          </a:xfrm>
+          <a:prstGeom prst="straightConnector1">
+            <a:avLst/>
+          </a:prstGeom>
+          <a:ln>
+            <a:tailEnd type="triangle"/>
+          </a:ln>
+        </p:spPr>
+        <p:style>
+          <a:lnRef idx="1">
+            <a:schemeClr val="accent1"/>
+          </a:lnRef>
+          <a:fillRef idx="0">
+            <a:schemeClr val="accent1"/>
+          </a:fillRef>
+          <a:effectRef idx="0">
+            <a:schemeClr val="accent1"/>
+          </a:effectRef>
+          <a:fontRef idx="minor">
+            <a:schemeClr val="tx1"/>
+          </a:fontRef>
+        </p:style>
+      </p:cxnSp>
+      <p:sp>
+        <p:nvSpPr>
+          <p:cNvPr id="41" name="椭圆 40">
+            <a:extLst>
+              <a:ext uri="{FF2B5EF4-FFF2-40B4-BE49-F238E27FC236}">
+                <a16:creationId xmlns:a16="http://schemas.microsoft.com/office/drawing/2014/main" id="{D8E73B4C-2791-2641-8A26-309B00926B49}"/>
+              </a:ext>
+            </a:extLst>
+          </p:cNvPr>
+          <p:cNvSpPr/>
+          <p:nvPr/>
+        </p:nvSpPr>
+        <p:spPr>
+          <a:xfrm>
+            <a:off x="4837715" y="1785871"/>
+            <a:ext cx="304800" cy="297180"/>
+          </a:xfrm>
+          <a:prstGeom prst="ellipse">
+            <a:avLst/>
+          </a:prstGeom>
+          <a:noFill/>
+          <a:ln w="25400"/>
+        </p:spPr>
+        <p:style>
+          <a:lnRef idx="2">
+            <a:schemeClr val="accent1">
+              <a:shade val="50000"/>
+            </a:schemeClr>
+          </a:lnRef>
+          <a:fillRef idx="1">
+            <a:schemeClr val="accent1"/>
+          </a:fillRef>
+          <a:effectRef idx="0">
+            <a:schemeClr val="accent1"/>
+          </a:effectRef>
+          <a:fontRef idx="minor">
+            <a:schemeClr val="lt1"/>
+          </a:fontRef>
+        </p:style>
+        <p:txBody>
+          <a:bodyPr rtlCol="0" anchor="ctr"/>
+          <a:lstStyle/>
+          <a:p>
+            <a:pPr algn="ctr"/>
+            <a:endParaRPr kumimoji="1" lang="zh-CN" altLang="en-US"/>
+          </a:p>
+        </p:txBody>
+      </p:sp>
+      <p:sp>
+        <p:nvSpPr>
+          <p:cNvPr id="42" name="椭圆 41">
+            <a:extLst>
+              <a:ext uri="{FF2B5EF4-FFF2-40B4-BE49-F238E27FC236}">
+                <a16:creationId xmlns:a16="http://schemas.microsoft.com/office/drawing/2014/main" id="{BECA202E-AA73-1245-BA85-B00B3D152057}"/>
+              </a:ext>
+            </a:extLst>
+          </p:cNvPr>
+          <p:cNvSpPr/>
+          <p:nvPr/>
+        </p:nvSpPr>
+        <p:spPr>
+          <a:xfrm>
+            <a:off x="5406574" y="1785871"/>
+            <a:ext cx="304800" cy="297180"/>
+          </a:xfrm>
+          <a:prstGeom prst="ellipse">
+            <a:avLst/>
+          </a:prstGeom>
+          <a:noFill/>
+          <a:ln w="25400"/>
+        </p:spPr>
+        <p:style>
+          <a:lnRef idx="2">
+            <a:schemeClr val="accent1">
+              <a:shade val="50000"/>
+            </a:schemeClr>
+          </a:lnRef>
+          <a:fillRef idx="1">
+            <a:schemeClr val="accent1"/>
+          </a:fillRef>
+          <a:effectRef idx="0">
+            <a:schemeClr val="accent1"/>
+          </a:effectRef>
+          <a:fontRef idx="minor">
+            <a:schemeClr val="lt1"/>
+          </a:fontRef>
+        </p:style>
+        <p:txBody>
+          <a:bodyPr rtlCol="0" anchor="ctr"/>
+          <a:lstStyle/>
+          <a:p>
+            <a:pPr algn="ctr"/>
+            <a:endParaRPr kumimoji="1" lang="zh-CN" altLang="en-US"/>
+          </a:p>
+        </p:txBody>
+      </p:sp>
+      <p:sp>
+        <p:nvSpPr>
+          <p:cNvPr id="43" name="椭圆 42">
+            <a:extLst>
+              <a:ext uri="{FF2B5EF4-FFF2-40B4-BE49-F238E27FC236}">
+                <a16:creationId xmlns:a16="http://schemas.microsoft.com/office/drawing/2014/main" id="{9815569B-7810-7441-9C43-F18B165A11F8}"/>
+              </a:ext>
+            </a:extLst>
+          </p:cNvPr>
+          <p:cNvSpPr/>
+          <p:nvPr/>
+        </p:nvSpPr>
+        <p:spPr>
+          <a:xfrm>
+            <a:off x="5975433" y="1782891"/>
+            <a:ext cx="304800" cy="297180"/>
+          </a:xfrm>
+          <a:prstGeom prst="ellipse">
+            <a:avLst/>
+          </a:prstGeom>
+          <a:noFill/>
+          <a:ln w="25400"/>
+        </p:spPr>
+        <p:style>
+          <a:lnRef idx="2">
+            <a:schemeClr val="accent1">
+              <a:shade val="50000"/>
+            </a:schemeClr>
+          </a:lnRef>
+          <a:fillRef idx="1">
+            <a:schemeClr val="accent1"/>
+          </a:fillRef>
+          <a:effectRef idx="0">
+            <a:schemeClr val="accent1"/>
+          </a:effectRef>
+          <a:fontRef idx="minor">
+            <a:schemeClr val="lt1"/>
+          </a:fontRef>
+        </p:style>
+        <p:txBody>
+          <a:bodyPr rtlCol="0" anchor="ctr"/>
+          <a:lstStyle/>
+          <a:p>
+            <a:pPr algn="ctr"/>
+            <a:endParaRPr kumimoji="1" lang="zh-CN" altLang="en-US"/>
+          </a:p>
+        </p:txBody>
+      </p:sp>
+      <p:sp>
+        <p:nvSpPr>
+          <p:cNvPr id="44" name="椭圆 43">
+            <a:extLst>
+              <a:ext uri="{FF2B5EF4-FFF2-40B4-BE49-F238E27FC236}">
+                <a16:creationId xmlns:a16="http://schemas.microsoft.com/office/drawing/2014/main" id="{BC13692C-3FCB-7047-B3A1-B97231B421E9}"/>
+              </a:ext>
+            </a:extLst>
+          </p:cNvPr>
+          <p:cNvSpPr/>
+          <p:nvPr/>
+        </p:nvSpPr>
+        <p:spPr>
+          <a:xfrm>
+            <a:off x="6544292" y="1782891"/>
+            <a:ext cx="304800" cy="297180"/>
+          </a:xfrm>
+          <a:prstGeom prst="ellipse">
+            <a:avLst/>
+          </a:prstGeom>
+          <a:noFill/>
+          <a:ln w="25400"/>
+        </p:spPr>
+        <p:style>
+          <a:lnRef idx="2">
+            <a:schemeClr val="accent1">
+              <a:shade val="50000"/>
+            </a:schemeClr>
+          </a:lnRef>
+          <a:fillRef idx="1">
+            <a:schemeClr val="accent1"/>
+          </a:fillRef>
+          <a:effectRef idx="0">
+            <a:schemeClr val="accent1"/>
+          </a:effectRef>
+          <a:fontRef idx="minor">
+            <a:schemeClr val="lt1"/>
+          </a:fontRef>
+        </p:style>
+        <p:txBody>
+          <a:bodyPr rtlCol="0" anchor="ctr"/>
+          <a:lstStyle/>
+          <a:p>
+            <a:pPr algn="ctr"/>
+            <a:endParaRPr kumimoji="1" lang="zh-CN" altLang="en-US"/>
+          </a:p>
+        </p:txBody>
+      </p:sp>
+      <p:cxnSp>
+        <p:nvCxnSpPr>
+          <p:cNvPr id="45" name="直线箭头连接符 44">
+            <a:extLst>
+              <a:ext uri="{FF2B5EF4-FFF2-40B4-BE49-F238E27FC236}">
+                <a16:creationId xmlns:a16="http://schemas.microsoft.com/office/drawing/2014/main" id="{4A868968-540A-584C-B8FB-2F4D97E25CA9}"/>
+              </a:ext>
+            </a:extLst>
+          </p:cNvPr>
+          <p:cNvCxnSpPr>
+            <a:stCxn id="41" idx="6"/>
+            <a:endCxn id="42" idx="2"/>
+          </p:cNvCxnSpPr>
+          <p:nvPr/>
+        </p:nvCxnSpPr>
+        <p:spPr>
+          <a:xfrm>
+            <a:off x="5142515" y="1934461"/>
+            <a:ext cx="264059" cy="0"/>
+          </a:xfrm>
+          <a:prstGeom prst="straightConnector1">
+            <a:avLst/>
+          </a:prstGeom>
+          <a:ln>
+            <a:tailEnd type="triangle"/>
+          </a:ln>
+        </p:spPr>
+        <p:style>
+          <a:lnRef idx="1">
+            <a:schemeClr val="accent1"/>
+          </a:lnRef>
+          <a:fillRef idx="0">
+            <a:schemeClr val="accent1"/>
+          </a:fillRef>
+          <a:effectRef idx="0">
+            <a:schemeClr val="accent1"/>
+          </a:effectRef>
+          <a:fontRef idx="minor">
+            <a:schemeClr val="tx1"/>
+          </a:fontRef>
+        </p:style>
+      </p:cxnSp>
+      <p:cxnSp>
+        <p:nvCxnSpPr>
+          <p:cNvPr id="46" name="直线箭头连接符 45">
+            <a:extLst>
+              <a:ext uri="{FF2B5EF4-FFF2-40B4-BE49-F238E27FC236}">
+                <a16:creationId xmlns:a16="http://schemas.microsoft.com/office/drawing/2014/main" id="{4C277C93-29F5-4544-927D-D85AF37D783B}"/>
+              </a:ext>
+            </a:extLst>
+          </p:cNvPr>
+          <p:cNvCxnSpPr>
+            <a:cxnSpLocks/>
+            <a:stCxn id="42" idx="6"/>
+            <a:endCxn id="43" idx="2"/>
+          </p:cNvCxnSpPr>
+          <p:nvPr/>
+        </p:nvCxnSpPr>
+        <p:spPr>
+          <a:xfrm flipV="1">
+            <a:off x="5711374" y="1931481"/>
+            <a:ext cx="264059" cy="2980"/>
+          </a:xfrm>
+          <a:prstGeom prst="straightConnector1">
+            <a:avLst/>
+          </a:prstGeom>
+          <a:ln>
+            <a:tailEnd type="triangle"/>
+          </a:ln>
+        </p:spPr>
+        <p:style>
+          <a:lnRef idx="1">
+            <a:schemeClr val="accent1"/>
+          </a:lnRef>
+          <a:fillRef idx="0">
+            <a:schemeClr val="accent1"/>
+          </a:fillRef>
+          <a:effectRef idx="0">
+            <a:schemeClr val="accent1"/>
+          </a:effectRef>
+          <a:fontRef idx="minor">
+            <a:schemeClr val="tx1"/>
+          </a:fontRef>
+        </p:style>
+      </p:cxnSp>
+      <p:cxnSp>
+        <p:nvCxnSpPr>
+          <p:cNvPr id="47" name="直线箭头连接符 46">
+            <a:extLst>
+              <a:ext uri="{FF2B5EF4-FFF2-40B4-BE49-F238E27FC236}">
+                <a16:creationId xmlns:a16="http://schemas.microsoft.com/office/drawing/2014/main" id="{89FE023C-4CC7-E54B-ABA2-831441FCAE8E}"/>
+              </a:ext>
+            </a:extLst>
+          </p:cNvPr>
+          <p:cNvCxnSpPr>
+            <a:stCxn id="43" idx="6"/>
+            <a:endCxn id="44" idx="2"/>
+          </p:cNvCxnSpPr>
+          <p:nvPr/>
+        </p:nvCxnSpPr>
+        <p:spPr>
+          <a:xfrm>
+            <a:off x="6280233" y="1931481"/>
+            <a:ext cx="264059" cy="0"/>
+          </a:xfrm>
+          <a:prstGeom prst="straightConnector1">
+            <a:avLst/>
+          </a:prstGeom>
+          <a:ln>
+            <a:tailEnd type="triangle"/>
+          </a:ln>
+        </p:spPr>
+        <p:style>
+          <a:lnRef idx="1">
+            <a:schemeClr val="accent1"/>
+          </a:lnRef>
+          <a:fillRef idx="0">
+            <a:schemeClr val="accent1"/>
+          </a:fillRef>
+          <a:effectRef idx="0">
+            <a:schemeClr val="accent1"/>
+          </a:effectRef>
+          <a:fontRef idx="minor">
+            <a:schemeClr val="tx1"/>
+          </a:fontRef>
+        </p:style>
+      </p:cxnSp>
+      <p:cxnSp>
+        <p:nvCxnSpPr>
+          <p:cNvPr id="48" name="直线箭头连接符 47">
+            <a:extLst>
+              <a:ext uri="{FF2B5EF4-FFF2-40B4-BE49-F238E27FC236}">
+                <a16:creationId xmlns:a16="http://schemas.microsoft.com/office/drawing/2014/main" id="{E279A78C-772C-9F44-90F2-9F29E75579C5}"/>
+              </a:ext>
+            </a:extLst>
+          </p:cNvPr>
+          <p:cNvCxnSpPr>
+            <a:cxnSpLocks/>
+            <a:stCxn id="44" idx="6"/>
+          </p:cNvCxnSpPr>
+          <p:nvPr/>
+        </p:nvCxnSpPr>
+        <p:spPr>
+          <a:xfrm>
+            <a:off x="6849092" y="1931481"/>
+            <a:ext cx="264059" cy="0"/>
+          </a:xfrm>
+          <a:prstGeom prst="straightConnector1">
+            <a:avLst/>
+          </a:prstGeom>
+          <a:ln>
+            <a:tailEnd type="triangle"/>
+          </a:ln>
+        </p:spPr>
+        <p:style>
+          <a:lnRef idx="1">
+            <a:schemeClr val="accent1"/>
+          </a:lnRef>
+          <a:fillRef idx="0">
+            <a:schemeClr val="accent1"/>
+          </a:fillRef>
+          <a:effectRef idx="0">
+            <a:schemeClr val="accent1"/>
+          </a:effectRef>
+          <a:fontRef idx="minor">
+            <a:schemeClr val="tx1"/>
+          </a:fontRef>
+        </p:style>
+      </p:cxnSp>
+      <p:sp>
+        <p:nvSpPr>
+          <p:cNvPr id="49" name="椭圆 48">
+            <a:extLst>
+              <a:ext uri="{FF2B5EF4-FFF2-40B4-BE49-F238E27FC236}">
+                <a16:creationId xmlns:a16="http://schemas.microsoft.com/office/drawing/2014/main" id="{BFC14748-6E5F-EE46-B776-44253072A142}"/>
+              </a:ext>
+            </a:extLst>
+          </p:cNvPr>
+          <p:cNvSpPr/>
+          <p:nvPr/>
+        </p:nvSpPr>
+        <p:spPr>
+          <a:xfrm>
+            <a:off x="4837715" y="2228661"/>
+            <a:ext cx="304800" cy="297180"/>
+          </a:xfrm>
+          <a:prstGeom prst="ellipse">
+            <a:avLst/>
+          </a:prstGeom>
+          <a:noFill/>
+          <a:ln w="25400">
+            <a:solidFill>
+              <a:srgbClr val="C00000"/>
+            </a:solidFill>
+            <a:prstDash val="dash"/>
+          </a:ln>
+        </p:spPr>
+        <p:style>
+          <a:lnRef idx="2">
+            <a:schemeClr val="accent1">
+              <a:shade val="50000"/>
+            </a:schemeClr>
+          </a:lnRef>
+          <a:fillRef idx="1">
+            <a:schemeClr val="accent1"/>
+          </a:fillRef>
+          <a:effectRef idx="0">
+            <a:schemeClr val="accent1"/>
+          </a:effectRef>
+          <a:fontRef idx="minor">
+            <a:schemeClr val="lt1"/>
+          </a:fontRef>
+        </p:style>
+        <p:txBody>
+          <a:bodyPr rtlCol="0" anchor="ctr"/>
+          <a:lstStyle/>
+          <a:p>
+            <a:pPr algn="ctr"/>
+            <a:endParaRPr kumimoji="1" lang="zh-CN" altLang="en-US"/>
+          </a:p>
+        </p:txBody>
+      </p:sp>
+      <p:sp>
+        <p:nvSpPr>
+          <p:cNvPr id="50" name="椭圆 49">
+            <a:extLst>
+              <a:ext uri="{FF2B5EF4-FFF2-40B4-BE49-F238E27FC236}">
+                <a16:creationId xmlns:a16="http://schemas.microsoft.com/office/drawing/2014/main" id="{F695B7A0-8DD2-3047-B430-96354E52844A}"/>
+              </a:ext>
+            </a:extLst>
+          </p:cNvPr>
+          <p:cNvSpPr/>
+          <p:nvPr/>
+        </p:nvSpPr>
+        <p:spPr>
+          <a:xfrm>
+            <a:off x="5406574" y="2228661"/>
+            <a:ext cx="304800" cy="297180"/>
+          </a:xfrm>
+          <a:prstGeom prst="ellipse">
+            <a:avLst/>
+          </a:prstGeom>
+          <a:noFill/>
+          <a:ln w="25400"/>
+        </p:spPr>
+        <p:style>
+          <a:lnRef idx="2">
+            <a:schemeClr val="accent1">
+              <a:shade val="50000"/>
+            </a:schemeClr>
+          </a:lnRef>
+          <a:fillRef idx="1">
+            <a:schemeClr val="accent1"/>
+          </a:fillRef>
+          <a:effectRef idx="0">
+            <a:schemeClr val="accent1"/>
+          </a:effectRef>
+          <a:fontRef idx="minor">
+            <a:schemeClr val="lt1"/>
+          </a:fontRef>
+        </p:style>
+        <p:txBody>
+          <a:bodyPr rtlCol="0" anchor="ctr"/>
+          <a:lstStyle/>
+          <a:p>
+            <a:pPr algn="ctr"/>
+            <a:endParaRPr kumimoji="1" lang="zh-CN" altLang="en-US"/>
+          </a:p>
+        </p:txBody>
+      </p:sp>
+      <p:sp>
+        <p:nvSpPr>
+          <p:cNvPr id="51" name="椭圆 50">
+            <a:extLst>
+              <a:ext uri="{FF2B5EF4-FFF2-40B4-BE49-F238E27FC236}">
+                <a16:creationId xmlns:a16="http://schemas.microsoft.com/office/drawing/2014/main" id="{2289AC6B-5495-F14A-A6BB-CB8AB334CAEC}"/>
+              </a:ext>
+            </a:extLst>
+          </p:cNvPr>
+          <p:cNvSpPr/>
+          <p:nvPr/>
+        </p:nvSpPr>
+        <p:spPr>
+          <a:xfrm>
+            <a:off x="5975433" y="2225681"/>
+            <a:ext cx="304800" cy="297180"/>
+          </a:xfrm>
+          <a:prstGeom prst="ellipse">
+            <a:avLst/>
+          </a:prstGeom>
+          <a:noFill/>
+          <a:ln w="25400"/>
+        </p:spPr>
+        <p:style>
+          <a:lnRef idx="2">
+            <a:schemeClr val="accent1">
+              <a:shade val="50000"/>
+            </a:schemeClr>
+          </a:lnRef>
+          <a:fillRef idx="1">
+            <a:schemeClr val="accent1"/>
+          </a:fillRef>
+          <a:effectRef idx="0">
+            <a:schemeClr val="accent1"/>
+          </a:effectRef>
+          <a:fontRef idx="minor">
+            <a:schemeClr val="lt1"/>
+          </a:fontRef>
+        </p:style>
+        <p:txBody>
+          <a:bodyPr rtlCol="0" anchor="ctr"/>
+          <a:lstStyle/>
+          <a:p>
+            <a:pPr algn="ctr"/>
+            <a:endParaRPr kumimoji="1" lang="zh-CN" altLang="en-US"/>
+          </a:p>
+        </p:txBody>
+      </p:sp>
+      <p:sp>
+        <p:nvSpPr>
+          <p:cNvPr id="52" name="椭圆 51">
+            <a:extLst>
+              <a:ext uri="{FF2B5EF4-FFF2-40B4-BE49-F238E27FC236}">
+                <a16:creationId xmlns:a16="http://schemas.microsoft.com/office/drawing/2014/main" id="{8881C692-79FA-704E-AECE-A421C425CBC7}"/>
+              </a:ext>
+            </a:extLst>
+          </p:cNvPr>
+          <p:cNvSpPr/>
+          <p:nvPr/>
+        </p:nvSpPr>
+        <p:spPr>
+          <a:xfrm>
+            <a:off x="6544292" y="2225681"/>
+            <a:ext cx="304800" cy="297180"/>
+          </a:xfrm>
+          <a:prstGeom prst="ellipse">
+            <a:avLst/>
+          </a:prstGeom>
+          <a:noFill/>
+          <a:ln w="25400"/>
+        </p:spPr>
+        <p:style>
+          <a:lnRef idx="2">
+            <a:schemeClr val="accent1">
+              <a:shade val="50000"/>
+            </a:schemeClr>
+          </a:lnRef>
+          <a:fillRef idx="1">
+            <a:schemeClr val="accent1"/>
+          </a:fillRef>
+          <a:effectRef idx="0">
+            <a:schemeClr val="accent1"/>
+          </a:effectRef>
+          <a:fontRef idx="minor">
+            <a:schemeClr val="lt1"/>
+          </a:fontRef>
+        </p:style>
+        <p:txBody>
+          <a:bodyPr rtlCol="0" anchor="ctr"/>
+          <a:lstStyle/>
+          <a:p>
+            <a:pPr algn="ctr"/>
+            <a:endParaRPr kumimoji="1" lang="zh-CN" altLang="en-US"/>
+          </a:p>
+        </p:txBody>
+      </p:sp>
+      <p:cxnSp>
+        <p:nvCxnSpPr>
+          <p:cNvPr id="53" name="直线箭头连接符 52">
+            <a:extLst>
+              <a:ext uri="{FF2B5EF4-FFF2-40B4-BE49-F238E27FC236}">
+                <a16:creationId xmlns:a16="http://schemas.microsoft.com/office/drawing/2014/main" id="{22E43156-2B4A-614B-9E7D-1571C3B2C12C}"/>
+              </a:ext>
+            </a:extLst>
+          </p:cNvPr>
+          <p:cNvCxnSpPr>
+            <a:stCxn id="49" idx="6"/>
+            <a:endCxn id="50" idx="2"/>
+          </p:cNvCxnSpPr>
+          <p:nvPr/>
+        </p:nvCxnSpPr>
+        <p:spPr>
+          <a:xfrm>
+            <a:off x="5142515" y="2377251"/>
+            <a:ext cx="264059" cy="0"/>
+          </a:xfrm>
+          <a:prstGeom prst="straightConnector1">
+            <a:avLst/>
+          </a:prstGeom>
+          <a:ln>
+            <a:tailEnd type="triangle"/>
+          </a:ln>
+        </p:spPr>
+        <p:style>
+          <a:lnRef idx="1">
+            <a:schemeClr val="accent1"/>
+          </a:lnRef>
+          <a:fillRef idx="0">
+            <a:schemeClr val="accent1"/>
+          </a:fillRef>
+          <a:effectRef idx="0">
+            <a:schemeClr val="accent1"/>
+          </a:effectRef>
+          <a:fontRef idx="minor">
+            <a:schemeClr val="tx1"/>
+          </a:fontRef>
+        </p:style>
+      </p:cxnSp>
+      <p:cxnSp>
+        <p:nvCxnSpPr>
+          <p:cNvPr id="54" name="直线箭头连接符 53">
+            <a:extLst>
+              <a:ext uri="{FF2B5EF4-FFF2-40B4-BE49-F238E27FC236}">
+                <a16:creationId xmlns:a16="http://schemas.microsoft.com/office/drawing/2014/main" id="{E7689691-1C89-B34B-A97D-1BC5396A56A8}"/>
+              </a:ext>
+            </a:extLst>
+          </p:cNvPr>
+          <p:cNvCxnSpPr>
+            <a:cxnSpLocks/>
+            <a:stCxn id="50" idx="6"/>
+            <a:endCxn id="51" idx="2"/>
+          </p:cNvCxnSpPr>
+          <p:nvPr/>
+        </p:nvCxnSpPr>
+        <p:spPr>
+          <a:xfrm flipV="1">
+            <a:off x="5711374" y="2374271"/>
+            <a:ext cx="264059" cy="2980"/>
+          </a:xfrm>
+          <a:prstGeom prst="straightConnector1">
+            <a:avLst/>
+          </a:prstGeom>
+          <a:ln>
+            <a:tailEnd type="triangle"/>
+          </a:ln>
+        </p:spPr>
+        <p:style>
+          <a:lnRef idx="1">
+            <a:schemeClr val="accent1"/>
+          </a:lnRef>
+          <a:fillRef idx="0">
+            <a:schemeClr val="accent1"/>
+          </a:fillRef>
+          <a:effectRef idx="0">
+            <a:schemeClr val="accent1"/>
+          </a:effectRef>
+          <a:fontRef idx="minor">
+            <a:schemeClr val="tx1"/>
+          </a:fontRef>
+        </p:style>
+      </p:cxnSp>
+      <p:cxnSp>
+        <p:nvCxnSpPr>
+          <p:cNvPr id="55" name="直线箭头连接符 54">
+            <a:extLst>
+              <a:ext uri="{FF2B5EF4-FFF2-40B4-BE49-F238E27FC236}">
+                <a16:creationId xmlns:a16="http://schemas.microsoft.com/office/drawing/2014/main" id="{7E0EDBB8-D8BC-BE47-AE86-59B053CFCA92}"/>
+              </a:ext>
+            </a:extLst>
+          </p:cNvPr>
+          <p:cNvCxnSpPr>
+            <a:stCxn id="51" idx="6"/>
+            <a:endCxn id="52" idx="2"/>
+          </p:cNvCxnSpPr>
+          <p:nvPr/>
+        </p:nvCxnSpPr>
+        <p:spPr>
+          <a:xfrm>
+            <a:off x="6280233" y="2374271"/>
+            <a:ext cx="264059" cy="0"/>
+          </a:xfrm>
+          <a:prstGeom prst="straightConnector1">
+            <a:avLst/>
+          </a:prstGeom>
+          <a:ln>
+            <a:tailEnd type="triangle"/>
+          </a:ln>
+        </p:spPr>
+        <p:style>
+          <a:lnRef idx="1">
+            <a:schemeClr val="accent1"/>
+          </a:lnRef>
+          <a:fillRef idx="0">
+            <a:schemeClr val="accent1"/>
+          </a:fillRef>
+          <a:effectRef idx="0">
+            <a:schemeClr val="accent1"/>
+          </a:effectRef>
+          <a:fontRef idx="minor">
+            <a:schemeClr val="tx1"/>
+          </a:fontRef>
+        </p:style>
+      </p:cxnSp>
+      <p:cxnSp>
+        <p:nvCxnSpPr>
+          <p:cNvPr id="56" name="直线箭头连接符 55">
+            <a:extLst>
+              <a:ext uri="{FF2B5EF4-FFF2-40B4-BE49-F238E27FC236}">
+                <a16:creationId xmlns:a16="http://schemas.microsoft.com/office/drawing/2014/main" id="{0A442C18-126F-9443-8B84-1B12D4783DE6}"/>
+              </a:ext>
+            </a:extLst>
+          </p:cNvPr>
+          <p:cNvCxnSpPr>
+            <a:cxnSpLocks/>
+            <a:stCxn id="52" idx="6"/>
+          </p:cNvCxnSpPr>
+          <p:nvPr/>
+        </p:nvCxnSpPr>
+        <p:spPr>
+          <a:xfrm>
+            <a:off x="6849092" y="2374271"/>
+            <a:ext cx="264059" cy="0"/>
+          </a:xfrm>
+          <a:prstGeom prst="straightConnector1">
+            <a:avLst/>
+          </a:prstGeom>
+          <a:ln>
+            <a:tailEnd type="triangle"/>
+          </a:ln>
+        </p:spPr>
+        <p:style>
+          <a:lnRef idx="1">
+            <a:schemeClr val="accent1"/>
+          </a:lnRef>
+          <a:fillRef idx="0">
+            <a:schemeClr val="accent1"/>
+          </a:fillRef>
+          <a:effectRef idx="0">
+            <a:schemeClr val="accent1"/>
+          </a:effectRef>
+          <a:fontRef idx="minor">
+            <a:schemeClr val="tx1"/>
+          </a:fontRef>
+        </p:style>
+      </p:cxnSp>
+      <p:sp>
+        <p:nvSpPr>
+          <p:cNvPr id="57" name="椭圆 56">
+            <a:extLst>
+              <a:ext uri="{FF2B5EF4-FFF2-40B4-BE49-F238E27FC236}">
+                <a16:creationId xmlns:a16="http://schemas.microsoft.com/office/drawing/2014/main" id="{28B909A1-CD20-644B-8433-97AB0EBD5159}"/>
+              </a:ext>
+            </a:extLst>
+          </p:cNvPr>
+          <p:cNvSpPr/>
+          <p:nvPr/>
+        </p:nvSpPr>
+        <p:spPr>
+          <a:xfrm>
+            <a:off x="4837715" y="2685749"/>
+            <a:ext cx="304800" cy="297180"/>
+          </a:xfrm>
+          <a:prstGeom prst="ellipse">
+            <a:avLst/>
+          </a:prstGeom>
+          <a:solidFill>
+            <a:schemeClr val="accent2">
+              <a:lumMod val="20000"/>
+              <a:lumOff val="80000"/>
+            </a:schemeClr>
+          </a:solidFill>
+          <a:ln w="25400">
+            <a:solidFill>
+              <a:srgbClr val="FF0000"/>
+            </a:solidFill>
+          </a:ln>
+        </p:spPr>
+        <p:style>
+          <a:lnRef idx="2">
+            <a:schemeClr val="accent1">
+              <a:shade val="50000"/>
+            </a:schemeClr>
+          </a:lnRef>
+          <a:fillRef idx="1">
+            <a:schemeClr val="accent1"/>
+          </a:fillRef>
+          <a:effectRef idx="0">
+            <a:schemeClr val="accent1"/>
+          </a:effectRef>
+          <a:fontRef idx="minor">
+            <a:schemeClr val="lt1"/>
+          </a:fontRef>
+        </p:style>
+        <p:txBody>
+          <a:bodyPr rtlCol="0" anchor="ctr"/>
+          <a:lstStyle/>
+          <a:p>
+            <a:pPr algn="ctr"/>
+            <a:endParaRPr kumimoji="1" lang="zh-CN" altLang="en-US"/>
+          </a:p>
+        </p:txBody>
+      </p:sp>
       <p:sp>
         <p:nvSpPr>
           <p:cNvPr id="58" name="椭圆 57">
@@ -6743,8 +6752,8 @@
           </a:fontRef>
         </p:style>
       </p:cxnSp>
-      <mc:AlternateContent xmlns:mc="http://schemas.openxmlformats.org/markup-compatibility/2006">
-        <mc:Choice xmlns:a14="http://schemas.microsoft.com/office/drawing/2010/main" Requires="a14">
+      <mc:AlternateContent xmlns:mc="http://schemas.openxmlformats.org/markup-compatibility/2006" xmlns:a14="http://schemas.microsoft.com/office/drawing/2010/main">
+        <mc:Choice Requires="a14">
           <p:sp>
             <p:nvSpPr>
               <p:cNvPr id="114" name="文本框 113">
@@ -6807,7 +6816,7 @@
             </p:txBody>
           </p:sp>
         </mc:Choice>
-        <mc:Fallback>
+        <mc:Fallback xmlns="">
           <p:sp>
             <p:nvSpPr>
               <p:cNvPr id="114" name="文本框 113">
@@ -6852,8 +6861,8 @@
           </p:sp>
         </mc:Fallback>
       </mc:AlternateContent>
-      <mc:AlternateContent xmlns:mc="http://schemas.openxmlformats.org/markup-compatibility/2006">
-        <mc:Choice xmlns:a14="http://schemas.microsoft.com/office/drawing/2010/main" Requires="a14">
+      <mc:AlternateContent xmlns:mc="http://schemas.openxmlformats.org/markup-compatibility/2006" xmlns:a14="http://schemas.microsoft.com/office/drawing/2010/main">
+        <mc:Choice Requires="a14">
           <p:sp>
             <p:nvSpPr>
               <p:cNvPr id="115" name="文本框 114">
@@ -6909,7 +6918,7 @@
             </p:txBody>
           </p:sp>
         </mc:Choice>
-        <mc:Fallback>
+        <mc:Fallback xmlns="">
           <p:sp>
             <p:nvSpPr>
               <p:cNvPr id="115" name="文本框 114">
@@ -6954,8 +6963,8 @@
           </p:sp>
         </mc:Fallback>
       </mc:AlternateContent>
-      <mc:AlternateContent xmlns:mc="http://schemas.openxmlformats.org/markup-compatibility/2006">
-        <mc:Choice xmlns:a14="http://schemas.microsoft.com/office/drawing/2010/main" Requires="a14">
+      <mc:AlternateContent xmlns:mc="http://schemas.openxmlformats.org/markup-compatibility/2006" xmlns:a14="http://schemas.microsoft.com/office/drawing/2010/main">
+        <mc:Choice Requires="a14">
           <p:sp>
             <p:nvSpPr>
               <p:cNvPr id="116" name="文本框 115">
@@ -7018,7 +7027,7 @@
             </p:txBody>
           </p:sp>
         </mc:Choice>
-        <mc:Fallback>
+        <mc:Fallback xmlns="">
           <p:sp>
             <p:nvSpPr>
               <p:cNvPr id="116" name="文本框 115">
@@ -7063,8 +7072,8 @@
           </p:sp>
         </mc:Fallback>
       </mc:AlternateContent>
-      <mc:AlternateContent xmlns:mc="http://schemas.openxmlformats.org/markup-compatibility/2006">
-        <mc:Choice xmlns:a14="http://schemas.microsoft.com/office/drawing/2010/main" Requires="a14">
+      <mc:AlternateContent xmlns:mc="http://schemas.openxmlformats.org/markup-compatibility/2006" xmlns:a14="http://schemas.microsoft.com/office/drawing/2010/main">
+        <mc:Choice Requires="a14">
           <p:sp>
             <p:nvSpPr>
               <p:cNvPr id="117" name="文本框 116">
@@ -7118,7 +7127,7 @@
             </p:txBody>
           </p:sp>
         </mc:Choice>
-        <mc:Fallback>
+        <mc:Fallback xmlns="">
           <p:sp>
             <p:nvSpPr>
               <p:cNvPr id="117" name="文本框 116">
@@ -7163,8 +7172,8 @@
           </p:sp>
         </mc:Fallback>
       </mc:AlternateContent>
-      <mc:AlternateContent xmlns:mc="http://schemas.openxmlformats.org/markup-compatibility/2006">
-        <mc:Choice xmlns:a14="http://schemas.microsoft.com/office/drawing/2010/main" Requires="a14">
+      <mc:AlternateContent xmlns:mc="http://schemas.openxmlformats.org/markup-compatibility/2006" xmlns:a14="http://schemas.microsoft.com/office/drawing/2010/main">
+        <mc:Choice Requires="a14">
           <p:sp>
             <p:nvSpPr>
               <p:cNvPr id="118" name="文本框 117">
@@ -7225,7 +7234,7 @@
             </p:txBody>
           </p:sp>
         </mc:Choice>
-        <mc:Fallback>
+        <mc:Fallback xmlns="">
           <p:sp>
             <p:nvSpPr>
               <p:cNvPr id="118" name="文本框 117">
@@ -7270,8 +7279,8 @@
           </p:sp>
         </mc:Fallback>
       </mc:AlternateContent>
-      <mc:AlternateContent xmlns:mc="http://schemas.openxmlformats.org/markup-compatibility/2006">
-        <mc:Choice xmlns:a14="http://schemas.microsoft.com/office/drawing/2010/main" Requires="a14">
+      <mc:AlternateContent xmlns:mc="http://schemas.openxmlformats.org/markup-compatibility/2006" xmlns:a14="http://schemas.microsoft.com/office/drawing/2010/main">
+        <mc:Choice Requires="a14">
           <p:sp>
             <p:nvSpPr>
               <p:cNvPr id="119" name="文本框 118">
@@ -7332,7 +7341,7 @@
             </p:txBody>
           </p:sp>
         </mc:Choice>
-        <mc:Fallback>
+        <mc:Fallback xmlns="">
           <p:sp>
             <p:nvSpPr>
               <p:cNvPr id="119" name="文本框 118">

</xml_diff>